<commit_message>
slides and prepped rmds.
</commit_message>
<xml_diff>
--- a/docs/Day 1 Slides.pptx
+++ b/docs/Day 1 Slides.pptx
@@ -5,7 +5,7 @@
     <p:sldMasterId id="2147483672" r:id="rId1"/>
   </p:sldMasterIdLst>
   <p:notesMasterIdLst>
-    <p:notesMasterId r:id="rId11"/>
+    <p:notesMasterId r:id="rId17"/>
   </p:notesMasterIdLst>
   <p:sldIdLst>
     <p:sldId id="256" r:id="rId2"/>
@@ -15,8 +15,14 @@
     <p:sldId id="373" r:id="rId6"/>
     <p:sldId id="381" r:id="rId7"/>
     <p:sldId id="382" r:id="rId8"/>
-    <p:sldId id="383" r:id="rId9"/>
-    <p:sldId id="384" r:id="rId10"/>
+    <p:sldId id="385" r:id="rId9"/>
+    <p:sldId id="386" r:id="rId10"/>
+    <p:sldId id="388" r:id="rId11"/>
+    <p:sldId id="389" r:id="rId12"/>
+    <p:sldId id="390" r:id="rId13"/>
+    <p:sldId id="387" r:id="rId14"/>
+    <p:sldId id="383" r:id="rId15"/>
+    <p:sldId id="384" r:id="rId16"/>
   </p:sldIdLst>
   <p:sldSz cx="12192000" cy="6858000"/>
   <p:notesSz cx="6858000" cy="9144000"/>
@@ -4130,6 +4136,849 @@
 </p:sld>
 </file>
 
+<file path=ppt/slides/slide10.xml><?xml version="1.0" encoding="utf-8"?>
+<p:sld xmlns:a="http://schemas.openxmlformats.org/drawingml/2006/main" xmlns:r="http://schemas.openxmlformats.org/officeDocument/2006/relationships" xmlns:p="http://schemas.openxmlformats.org/presentationml/2006/main">
+  <p:cSld>
+    <p:spTree>
+      <p:nvGrpSpPr>
+        <p:cNvPr id="1" name=""/>
+        <p:cNvGrpSpPr/>
+        <p:nvPr/>
+      </p:nvGrpSpPr>
+      <p:grpSpPr>
+        <a:xfrm>
+          <a:off x="0" y="0"/>
+          <a:ext cx="0" cy="0"/>
+          <a:chOff x="0" y="0"/>
+          <a:chExt cx="0" cy="0"/>
+        </a:xfrm>
+      </p:grpSpPr>
+      <p:sp>
+        <p:nvSpPr>
+          <p:cNvPr id="2" name="Title 1"/>
+          <p:cNvSpPr>
+            <a:spLocks noGrp="1"/>
+          </p:cNvSpPr>
+          <p:nvPr>
+            <p:ph type="title"/>
+          </p:nvPr>
+        </p:nvSpPr>
+        <p:spPr/>
+        <p:txBody>
+          <a:bodyPr/>
+          <a:lstStyle/>
+          <a:p>
+            <a:r>
+              <a:rPr lang="en-US" dirty="0" smtClean="0"/>
+              <a:t>Data Cleaning</a:t>
+            </a:r>
+            <a:endParaRPr lang="en-US" dirty="0"/>
+          </a:p>
+        </p:txBody>
+      </p:sp>
+      <p:sp>
+        <p:nvSpPr>
+          <p:cNvPr id="3" name="Content Placeholder 2"/>
+          <p:cNvSpPr>
+            <a:spLocks noGrp="1"/>
+          </p:cNvSpPr>
+          <p:nvPr>
+            <p:ph idx="1"/>
+          </p:nvPr>
+        </p:nvSpPr>
+        <p:spPr/>
+        <p:txBody>
+          <a:bodyPr>
+            <a:normAutofit/>
+          </a:bodyPr>
+          <a:lstStyle/>
+          <a:p>
+            <a:r>
+              <a:rPr lang="en-US" dirty="0" smtClean="0"/>
+              <a:t>Why the pipe!?!?</a:t>
+            </a:r>
+          </a:p>
+          <a:p>
+            <a:r>
+              <a:rPr lang="en-US" dirty="0" smtClean="0"/>
+              <a:t>Instead of reading/writing:</a:t>
+            </a:r>
+          </a:p>
+          <a:p>
+            <a:pPr lvl="1"/>
+            <a:endParaRPr lang="en-US" dirty="0" smtClean="0"/>
+          </a:p>
+          <a:p>
+            <a:pPr marL="274320" lvl="1" indent="0" algn="ctr">
+              <a:buNone/>
+            </a:pPr>
+            <a:r>
+              <a:rPr lang="en-US" b="1" dirty="0" smtClean="0"/>
+              <a:t>select(filter(mutate(dataset, </a:t>
+            </a:r>
+            <a:r>
+              <a:rPr lang="en-US" b="1" dirty="0" err="1" smtClean="0"/>
+              <a:t>bdi</a:t>
+            </a:r>
+            <a:r>
+              <a:rPr lang="en-US" b="1" dirty="0" smtClean="0"/>
+              <a:t> = bdi1 + bdi2 + bdi3), age &gt;= 18) </a:t>
+            </a:r>
+            <a:r>
+              <a:rPr lang="en-US" b="1" dirty="0" err="1" smtClean="0"/>
+              <a:t>bdi</a:t>
+            </a:r>
+            <a:r>
+              <a:rPr lang="en-US" b="1" dirty="0" smtClean="0"/>
+              <a:t>, </a:t>
+            </a:r>
+            <a:r>
+              <a:rPr lang="en-US" b="1" dirty="0" err="1" smtClean="0"/>
+              <a:t>soc_sprt</a:t>
+            </a:r>
+            <a:r>
+              <a:rPr lang="en-US" b="1" dirty="0" smtClean="0"/>
+              <a:t>)</a:t>
+            </a:r>
+          </a:p>
+          <a:p>
+            <a:r>
+              <a:rPr lang="en-US" dirty="0" smtClean="0"/>
+              <a:t>We can write:</a:t>
+            </a:r>
+          </a:p>
+          <a:p>
+            <a:pPr lvl="1"/>
+            <a:endParaRPr lang="en-US" dirty="0" smtClean="0"/>
+          </a:p>
+          <a:p>
+            <a:pPr marL="1319213" lvl="1" indent="-457200">
+              <a:buNone/>
+            </a:pPr>
+            <a:r>
+              <a:rPr lang="en-US" b="1" dirty="0" smtClean="0"/>
+              <a:t>dataset </a:t>
+            </a:r>
+            <a:r>
+              <a:rPr lang="en-US" b="1" dirty="0" smtClean="0">
+                <a:solidFill>
+                  <a:srgbClr val="7030A0"/>
+                </a:solidFill>
+              </a:rPr>
+              <a:t>%&gt;%</a:t>
+            </a:r>
+            <a:endParaRPr lang="en-US" b="1" dirty="0">
+              <a:solidFill>
+                <a:srgbClr val="7030A0"/>
+              </a:solidFill>
+            </a:endParaRPr>
+          </a:p>
+          <a:p>
+            <a:pPr marL="1319213" lvl="1" indent="-457200">
+              <a:buNone/>
+            </a:pPr>
+            <a:r>
+              <a:rPr lang="en-US" b="1" dirty="0" smtClean="0"/>
+              <a:t>	mutate(</a:t>
+            </a:r>
+            <a:r>
+              <a:rPr lang="en-US" b="1" dirty="0" err="1"/>
+              <a:t>bdi</a:t>
+            </a:r>
+            <a:r>
+              <a:rPr lang="en-US" b="1" dirty="0"/>
+              <a:t> = </a:t>
+            </a:r>
+            <a:r>
+              <a:rPr lang="en-US" b="1" dirty="0" smtClean="0"/>
+              <a:t>bdi1 </a:t>
+            </a:r>
+            <a:r>
+              <a:rPr lang="en-US" b="1" dirty="0"/>
+              <a:t>+ bdi2 + bdi3</a:t>
+            </a:r>
+            <a:r>
+              <a:rPr lang="en-US" b="1" dirty="0" smtClean="0"/>
+              <a:t>) </a:t>
+            </a:r>
+            <a:r>
+              <a:rPr lang="en-US" b="1" dirty="0" smtClean="0">
+                <a:solidFill>
+                  <a:srgbClr val="7030A0"/>
+                </a:solidFill>
+              </a:rPr>
+              <a:t>%&gt;%</a:t>
+            </a:r>
+          </a:p>
+          <a:p>
+            <a:pPr marL="1319213" lvl="1" indent="-457200">
+              <a:buNone/>
+            </a:pPr>
+            <a:r>
+              <a:rPr lang="en-US" b="1" dirty="0"/>
+              <a:t>	</a:t>
+            </a:r>
+            <a:r>
+              <a:rPr lang="en-US" b="1" dirty="0" smtClean="0"/>
+              <a:t>filter(age &gt;= 18) </a:t>
+            </a:r>
+            <a:r>
+              <a:rPr lang="en-US" b="1" dirty="0" smtClean="0">
+                <a:solidFill>
+                  <a:srgbClr val="7030A0"/>
+                </a:solidFill>
+              </a:rPr>
+              <a:t>%&gt;%</a:t>
+            </a:r>
+          </a:p>
+          <a:p>
+            <a:pPr marL="1319213" lvl="1" indent="-457200">
+              <a:buNone/>
+            </a:pPr>
+            <a:r>
+              <a:rPr lang="en-US" b="1" dirty="0"/>
+              <a:t>	</a:t>
+            </a:r>
+            <a:r>
+              <a:rPr lang="en-US" b="1" dirty="0" smtClean="0"/>
+              <a:t>select(</a:t>
+            </a:r>
+            <a:r>
+              <a:rPr lang="en-US" b="1" dirty="0" err="1" smtClean="0"/>
+              <a:t>bdi</a:t>
+            </a:r>
+            <a:r>
+              <a:rPr lang="en-US" b="1" dirty="0" smtClean="0"/>
+              <a:t>, </a:t>
+            </a:r>
+            <a:r>
+              <a:rPr lang="en-US" b="1" dirty="0" err="1" smtClean="0"/>
+              <a:t>soc_sprt</a:t>
+            </a:r>
+            <a:r>
+              <a:rPr lang="en-US" b="1" dirty="0" smtClean="0"/>
+              <a:t>)</a:t>
+            </a:r>
+          </a:p>
+        </p:txBody>
+      </p:sp>
+    </p:spTree>
+    <p:extLst>
+      <p:ext uri="{BB962C8B-B14F-4D97-AF65-F5344CB8AC3E}">
+        <p14:creationId xmlns:p14="http://schemas.microsoft.com/office/powerpoint/2010/main" val="1981729160"/>
+      </p:ext>
+    </p:extLst>
+  </p:cSld>
+  <p:clrMapOvr>
+    <a:masterClrMapping/>
+  </p:clrMapOvr>
+</p:sld>
+</file>
+
+<file path=ppt/slides/slide11.xml><?xml version="1.0" encoding="utf-8"?>
+<p:sld xmlns:a="http://schemas.openxmlformats.org/drawingml/2006/main" xmlns:r="http://schemas.openxmlformats.org/officeDocument/2006/relationships" xmlns:p="http://schemas.openxmlformats.org/presentationml/2006/main">
+  <p:cSld>
+    <p:spTree>
+      <p:nvGrpSpPr>
+        <p:cNvPr id="1" name=""/>
+        <p:cNvGrpSpPr/>
+        <p:nvPr/>
+      </p:nvGrpSpPr>
+      <p:grpSpPr>
+        <a:xfrm>
+          <a:off x="0" y="0"/>
+          <a:ext cx="0" cy="0"/>
+          <a:chOff x="0" y="0"/>
+          <a:chExt cx="0" cy="0"/>
+        </a:xfrm>
+      </p:grpSpPr>
+      <p:sp>
+        <p:nvSpPr>
+          <p:cNvPr id="2" name="Title 1"/>
+          <p:cNvSpPr>
+            <a:spLocks noGrp="1"/>
+          </p:cNvSpPr>
+          <p:nvPr>
+            <p:ph type="title"/>
+          </p:nvPr>
+        </p:nvSpPr>
+        <p:spPr/>
+        <p:txBody>
+          <a:bodyPr/>
+          <a:lstStyle/>
+          <a:p>
+            <a:r>
+              <a:rPr lang="en-US" dirty="0" smtClean="0"/>
+              <a:t>Data Cleaning</a:t>
+            </a:r>
+            <a:endParaRPr lang="en-US" dirty="0"/>
+          </a:p>
+        </p:txBody>
+      </p:sp>
+      <p:sp>
+        <p:nvSpPr>
+          <p:cNvPr id="3" name="Content Placeholder 2"/>
+          <p:cNvSpPr>
+            <a:spLocks noGrp="1"/>
+          </p:cNvSpPr>
+          <p:nvPr>
+            <p:ph idx="1"/>
+          </p:nvPr>
+        </p:nvSpPr>
+        <p:spPr/>
+        <p:txBody>
+          <a:bodyPr>
+            <a:normAutofit/>
+          </a:bodyPr>
+          <a:lstStyle/>
+          <a:p>
+            <a:r>
+              <a:rPr lang="en-US" dirty="0" smtClean="0"/>
+              <a:t>If you wanted to save this two-variable dataset:</a:t>
+            </a:r>
+          </a:p>
+          <a:p>
+            <a:pPr marL="1319213" lvl="1" indent="-457200">
+              <a:buNone/>
+            </a:pPr>
+            <a:endParaRPr lang="en-US" dirty="0"/>
+          </a:p>
+          <a:p>
+            <a:pPr marL="3032125" lvl="1" indent="-2170113">
+              <a:buNone/>
+            </a:pPr>
+            <a:r>
+              <a:rPr lang="en-US" b="1" dirty="0" err="1" smtClean="0"/>
+              <a:t>dataset_small</a:t>
+            </a:r>
+            <a:r>
+              <a:rPr lang="en-US" b="1" dirty="0" smtClean="0"/>
+              <a:t> &lt;- dataset </a:t>
+            </a:r>
+            <a:r>
+              <a:rPr lang="en-US" b="1" dirty="0" smtClean="0">
+                <a:solidFill>
+                  <a:srgbClr val="7030A0"/>
+                </a:solidFill>
+              </a:rPr>
+              <a:t>%&gt;%</a:t>
+            </a:r>
+            <a:endParaRPr lang="en-US" b="1" dirty="0">
+              <a:solidFill>
+                <a:srgbClr val="7030A0"/>
+              </a:solidFill>
+            </a:endParaRPr>
+          </a:p>
+          <a:p>
+            <a:pPr marL="3032125" lvl="1" indent="-2170113">
+              <a:buNone/>
+            </a:pPr>
+            <a:r>
+              <a:rPr lang="en-US" b="1" dirty="0" smtClean="0"/>
+              <a:t>	mutate(</a:t>
+            </a:r>
+            <a:r>
+              <a:rPr lang="en-US" b="1" dirty="0" err="1"/>
+              <a:t>bdi</a:t>
+            </a:r>
+            <a:r>
+              <a:rPr lang="en-US" b="1" dirty="0"/>
+              <a:t> = </a:t>
+            </a:r>
+            <a:r>
+              <a:rPr lang="en-US" b="1" dirty="0" smtClean="0"/>
+              <a:t>bdi1 </a:t>
+            </a:r>
+            <a:r>
+              <a:rPr lang="en-US" b="1" dirty="0"/>
+              <a:t>+ bdi2 + bdi3</a:t>
+            </a:r>
+            <a:r>
+              <a:rPr lang="en-US" b="1" dirty="0" smtClean="0"/>
+              <a:t>) </a:t>
+            </a:r>
+            <a:r>
+              <a:rPr lang="en-US" b="1" dirty="0" smtClean="0">
+                <a:solidFill>
+                  <a:srgbClr val="7030A0"/>
+                </a:solidFill>
+              </a:rPr>
+              <a:t>%&gt;%</a:t>
+            </a:r>
+          </a:p>
+          <a:p>
+            <a:pPr marL="3032125" lvl="1" indent="-2170113">
+              <a:buNone/>
+            </a:pPr>
+            <a:r>
+              <a:rPr lang="en-US" b="1" dirty="0"/>
+              <a:t>	</a:t>
+            </a:r>
+            <a:r>
+              <a:rPr lang="en-US" b="1" dirty="0" smtClean="0"/>
+              <a:t>filter(age &gt;= 18) </a:t>
+            </a:r>
+            <a:r>
+              <a:rPr lang="en-US" b="1" dirty="0" smtClean="0">
+                <a:solidFill>
+                  <a:srgbClr val="7030A0"/>
+                </a:solidFill>
+              </a:rPr>
+              <a:t>%&gt;%</a:t>
+            </a:r>
+          </a:p>
+          <a:p>
+            <a:pPr marL="3032125" lvl="1" indent="-2170113">
+              <a:buNone/>
+            </a:pPr>
+            <a:r>
+              <a:rPr lang="en-US" b="1" dirty="0"/>
+              <a:t>	</a:t>
+            </a:r>
+            <a:r>
+              <a:rPr lang="en-US" b="1" dirty="0" smtClean="0"/>
+              <a:t>select(</a:t>
+            </a:r>
+            <a:r>
+              <a:rPr lang="en-US" b="1" dirty="0" err="1" smtClean="0"/>
+              <a:t>bdi</a:t>
+            </a:r>
+            <a:r>
+              <a:rPr lang="en-US" b="1" dirty="0" smtClean="0"/>
+              <a:t>, </a:t>
+            </a:r>
+            <a:r>
+              <a:rPr lang="en-US" b="1" dirty="0" err="1" smtClean="0"/>
+              <a:t>soc_sprt</a:t>
+            </a:r>
+            <a:r>
+              <a:rPr lang="en-US" b="1" dirty="0" smtClean="0"/>
+              <a:t>)</a:t>
+            </a:r>
+          </a:p>
+        </p:txBody>
+      </p:sp>
+    </p:spTree>
+    <p:extLst>
+      <p:ext uri="{BB962C8B-B14F-4D97-AF65-F5344CB8AC3E}">
+        <p14:creationId xmlns:p14="http://schemas.microsoft.com/office/powerpoint/2010/main" val="2082057988"/>
+      </p:ext>
+    </p:extLst>
+  </p:cSld>
+  <p:clrMapOvr>
+    <a:masterClrMapping/>
+  </p:clrMapOvr>
+</p:sld>
+</file>
+
+<file path=ppt/slides/slide12.xml><?xml version="1.0" encoding="utf-8"?>
+<p:sld xmlns:a="http://schemas.openxmlformats.org/drawingml/2006/main" xmlns:r="http://schemas.openxmlformats.org/officeDocument/2006/relationships" xmlns:p="http://schemas.openxmlformats.org/presentationml/2006/main">
+  <p:cSld>
+    <p:spTree>
+      <p:nvGrpSpPr>
+        <p:cNvPr id="1" name=""/>
+        <p:cNvGrpSpPr/>
+        <p:nvPr/>
+      </p:nvGrpSpPr>
+      <p:grpSpPr>
+        <a:xfrm>
+          <a:off x="0" y="0"/>
+          <a:ext cx="0" cy="0"/>
+          <a:chOff x="0" y="0"/>
+          <a:chExt cx="0" cy="0"/>
+        </a:xfrm>
+      </p:grpSpPr>
+      <p:sp>
+        <p:nvSpPr>
+          <p:cNvPr id="2" name="Title 1"/>
+          <p:cNvSpPr>
+            <a:spLocks noGrp="1"/>
+          </p:cNvSpPr>
+          <p:nvPr>
+            <p:ph type="title"/>
+          </p:nvPr>
+        </p:nvSpPr>
+        <p:spPr/>
+        <p:txBody>
+          <a:bodyPr/>
+          <a:lstStyle/>
+          <a:p>
+            <a:r>
+              <a:rPr lang="en-US" dirty="0" smtClean="0"/>
+              <a:t>Data Cleaning</a:t>
+            </a:r>
+            <a:endParaRPr lang="en-US" dirty="0"/>
+          </a:p>
+        </p:txBody>
+      </p:sp>
+      <p:sp>
+        <p:nvSpPr>
+          <p:cNvPr id="3" name="Content Placeholder 2"/>
+          <p:cNvSpPr>
+            <a:spLocks noGrp="1"/>
+          </p:cNvSpPr>
+          <p:nvPr>
+            <p:ph idx="1"/>
+          </p:nvPr>
+        </p:nvSpPr>
+        <p:spPr/>
+        <p:txBody>
+          <a:bodyPr>
+            <a:normAutofit lnSpcReduction="10000"/>
+          </a:bodyPr>
+          <a:lstStyle/>
+          <a:p>
+            <a:r>
+              <a:rPr lang="en-US" dirty="0" smtClean="0"/>
+              <a:t>There are also verbs for </a:t>
+            </a:r>
+            <a:r>
+              <a:rPr lang="en-US" b="1" dirty="0" smtClean="0"/>
+              <a:t>joining two tables</a:t>
+            </a:r>
+          </a:p>
+          <a:p>
+            <a:pPr lvl="1"/>
+            <a:r>
+              <a:rPr lang="en-US" u="sng" dirty="0" smtClean="0"/>
+              <a:t>Adding cases </a:t>
+            </a:r>
+            <a:r>
+              <a:rPr lang="en-US" dirty="0" smtClean="0"/>
+              <a:t>from another dataset that has the same variables</a:t>
+            </a:r>
+          </a:p>
+          <a:p>
+            <a:pPr lvl="2"/>
+            <a:r>
+              <a:rPr lang="en-US" dirty="0" smtClean="0"/>
+              <a:t>And also when they do not have exactly the same variables</a:t>
+            </a:r>
+          </a:p>
+          <a:p>
+            <a:pPr lvl="1"/>
+            <a:r>
+              <a:rPr lang="en-US" u="sng" dirty="0"/>
+              <a:t>Adding variables </a:t>
+            </a:r>
+            <a:r>
+              <a:rPr lang="en-US" dirty="0"/>
+              <a:t>from another dataset</a:t>
+            </a:r>
+          </a:p>
+          <a:p>
+            <a:pPr lvl="2"/>
+            <a:r>
+              <a:rPr lang="en-US" dirty="0"/>
+              <a:t>These variables can be measured at the same level or at a higher level, as long as there are index variables</a:t>
+            </a:r>
+            <a:r>
+              <a:rPr lang="en-US" dirty="0" smtClean="0"/>
+              <a:t>.</a:t>
+            </a:r>
+            <a:endParaRPr lang="en-US" dirty="0"/>
+          </a:p>
+          <a:p>
+            <a:pPr lvl="2"/>
+            <a:endParaRPr lang="en-US" dirty="0" smtClean="0"/>
+          </a:p>
+          <a:p>
+            <a:r>
+              <a:rPr lang="en-US" dirty="0" smtClean="0"/>
+              <a:t>And verbs for </a:t>
+            </a:r>
+            <a:r>
+              <a:rPr lang="en-US" b="1" dirty="0" smtClean="0"/>
+              <a:t>transforming data </a:t>
+            </a:r>
+            <a:r>
+              <a:rPr lang="en-US" dirty="0" smtClean="0"/>
+              <a:t>from </a:t>
+            </a:r>
+          </a:p>
+          <a:p>
+            <a:pPr lvl="1"/>
+            <a:r>
+              <a:rPr lang="en-US" dirty="0" smtClean="0"/>
+              <a:t>Wide-to-long</a:t>
+            </a:r>
+          </a:p>
+          <a:p>
+            <a:pPr lvl="1"/>
+            <a:r>
+              <a:rPr lang="en-US" dirty="0" smtClean="0"/>
+              <a:t>Long-to-wide</a:t>
+            </a:r>
+          </a:p>
+          <a:p>
+            <a:pPr lvl="2"/>
+            <a:endParaRPr lang="en-US" dirty="0"/>
+          </a:p>
+          <a:p>
+            <a:r>
+              <a:rPr lang="en-US" dirty="0" smtClean="0"/>
+              <a:t>We can learn these on Day 3 if you want</a:t>
+            </a:r>
+            <a:r>
+              <a:rPr lang="mr-IN" dirty="0" smtClean="0"/>
+              <a:t>…</a:t>
+            </a:r>
+            <a:r>
+              <a:rPr lang="en-US" dirty="0" smtClean="0"/>
+              <a:t>?</a:t>
+            </a:r>
+            <a:endParaRPr lang="en-US" dirty="0"/>
+          </a:p>
+        </p:txBody>
+      </p:sp>
+    </p:spTree>
+    <p:extLst>
+      <p:ext uri="{BB962C8B-B14F-4D97-AF65-F5344CB8AC3E}">
+        <p14:creationId xmlns:p14="http://schemas.microsoft.com/office/powerpoint/2010/main" val="1640435855"/>
+      </p:ext>
+    </p:extLst>
+  </p:cSld>
+  <p:clrMapOvr>
+    <a:masterClrMapping/>
+  </p:clrMapOvr>
+</p:sld>
+</file>
+
+<file path=ppt/slides/slide13.xml><?xml version="1.0" encoding="utf-8"?>
+<p:sld xmlns:a="http://schemas.openxmlformats.org/drawingml/2006/main" xmlns:r="http://schemas.openxmlformats.org/officeDocument/2006/relationships" xmlns:p="http://schemas.openxmlformats.org/presentationml/2006/main">
+  <p:cSld>
+    <p:spTree>
+      <p:nvGrpSpPr>
+        <p:cNvPr id="1" name=""/>
+        <p:cNvGrpSpPr/>
+        <p:nvPr/>
+      </p:nvGrpSpPr>
+      <p:grpSpPr>
+        <a:xfrm>
+          <a:off x="0" y="0"/>
+          <a:ext cx="0" cy="0"/>
+          <a:chOff x="0" y="0"/>
+          <a:chExt cx="0" cy="0"/>
+        </a:xfrm>
+      </p:grpSpPr>
+      <p:sp>
+        <p:nvSpPr>
+          <p:cNvPr id="4" name="Title 3"/>
+          <p:cNvSpPr>
+            <a:spLocks noGrp="1"/>
+          </p:cNvSpPr>
+          <p:nvPr>
+            <p:ph type="title"/>
+          </p:nvPr>
+        </p:nvSpPr>
+        <p:spPr/>
+        <p:txBody>
+          <a:bodyPr/>
+          <a:lstStyle/>
+          <a:p>
+            <a:r>
+              <a:rPr lang="en-US" dirty="0" smtClean="0"/>
+              <a:t>R Markdown File</a:t>
+            </a:r>
+            <a:endParaRPr lang="en-US" dirty="0"/>
+          </a:p>
+        </p:txBody>
+      </p:sp>
+      <p:sp>
+        <p:nvSpPr>
+          <p:cNvPr id="5" name="Text Placeholder 4"/>
+          <p:cNvSpPr>
+            <a:spLocks noGrp="1"/>
+          </p:cNvSpPr>
+          <p:nvPr>
+            <p:ph type="body" idx="1"/>
+          </p:nvPr>
+        </p:nvSpPr>
+        <p:spPr/>
+        <p:txBody>
+          <a:bodyPr/>
+          <a:lstStyle/>
+          <a:p>
+            <a:endParaRPr lang="en-US"/>
+          </a:p>
+        </p:txBody>
+      </p:sp>
+    </p:spTree>
+    <p:extLst>
+      <p:ext uri="{BB962C8B-B14F-4D97-AF65-F5344CB8AC3E}">
+        <p14:creationId xmlns:p14="http://schemas.microsoft.com/office/powerpoint/2010/main" val="1526362263"/>
+      </p:ext>
+    </p:extLst>
+  </p:cSld>
+  <p:clrMapOvr>
+    <a:masterClrMapping/>
+  </p:clrMapOvr>
+</p:sld>
+</file>
+
+<file path=ppt/slides/slide14.xml><?xml version="1.0" encoding="utf-8"?>
+<p:sld xmlns:a="http://schemas.openxmlformats.org/drawingml/2006/main" xmlns:r="http://schemas.openxmlformats.org/officeDocument/2006/relationships" xmlns:p="http://schemas.openxmlformats.org/presentationml/2006/main">
+  <p:cSld>
+    <p:spTree>
+      <p:nvGrpSpPr>
+        <p:cNvPr id="1" name=""/>
+        <p:cNvGrpSpPr/>
+        <p:nvPr/>
+      </p:nvGrpSpPr>
+      <p:grpSpPr>
+        <a:xfrm>
+          <a:off x="0" y="0"/>
+          <a:ext cx="0" cy="0"/>
+          <a:chOff x="0" y="0"/>
+          <a:chExt cx="0" cy="0"/>
+        </a:xfrm>
+      </p:grpSpPr>
+      <p:sp>
+        <p:nvSpPr>
+          <p:cNvPr id="2" name="Title 1"/>
+          <p:cNvSpPr>
+            <a:spLocks noGrp="1"/>
+          </p:cNvSpPr>
+          <p:nvPr>
+            <p:ph type="title"/>
+          </p:nvPr>
+        </p:nvSpPr>
+        <p:spPr/>
+        <p:txBody>
+          <a:bodyPr/>
+          <a:lstStyle/>
+          <a:p>
+            <a:r>
+              <a:rPr lang="en-US" dirty="0" smtClean="0"/>
+              <a:t>Making Basic Figures</a:t>
+            </a:r>
+            <a:endParaRPr lang="en-US" dirty="0"/>
+          </a:p>
+        </p:txBody>
+      </p:sp>
+      <p:sp>
+        <p:nvSpPr>
+          <p:cNvPr id="3" name="Content Placeholder 2"/>
+          <p:cNvSpPr>
+            <a:spLocks noGrp="1"/>
+          </p:cNvSpPr>
+          <p:nvPr>
+            <p:ph idx="1"/>
+          </p:nvPr>
+        </p:nvSpPr>
+        <p:spPr/>
+        <p:txBody>
+          <a:bodyPr/>
+          <a:lstStyle/>
+          <a:p>
+            <a:r>
+              <a:rPr lang="en-US" dirty="0" smtClean="0"/>
+              <a:t>ggplot2</a:t>
+            </a:r>
+            <a:endParaRPr lang="en-US" dirty="0"/>
+          </a:p>
+        </p:txBody>
+      </p:sp>
+    </p:spTree>
+    <p:extLst>
+      <p:ext uri="{BB962C8B-B14F-4D97-AF65-F5344CB8AC3E}">
+        <p14:creationId xmlns:p14="http://schemas.microsoft.com/office/powerpoint/2010/main" val="332671968"/>
+      </p:ext>
+    </p:extLst>
+  </p:cSld>
+  <p:clrMapOvr>
+    <a:masterClrMapping/>
+  </p:clrMapOvr>
+</p:sld>
+</file>
+
+<file path=ppt/slides/slide15.xml><?xml version="1.0" encoding="utf-8"?>
+<p:sld xmlns:a="http://schemas.openxmlformats.org/drawingml/2006/main" xmlns:r="http://schemas.openxmlformats.org/officeDocument/2006/relationships" xmlns:p="http://schemas.openxmlformats.org/presentationml/2006/main">
+  <p:cSld>
+    <p:spTree>
+      <p:nvGrpSpPr>
+        <p:cNvPr id="1" name=""/>
+        <p:cNvGrpSpPr/>
+        <p:nvPr/>
+      </p:nvGrpSpPr>
+      <p:grpSpPr>
+        <a:xfrm>
+          <a:off x="0" y="0"/>
+          <a:ext cx="0" cy="0"/>
+          <a:chOff x="0" y="0"/>
+          <a:chExt cx="0" cy="0"/>
+        </a:xfrm>
+      </p:grpSpPr>
+      <p:sp>
+        <p:nvSpPr>
+          <p:cNvPr id="2" name="Title 1"/>
+          <p:cNvSpPr>
+            <a:spLocks noGrp="1"/>
+          </p:cNvSpPr>
+          <p:nvPr>
+            <p:ph type="title"/>
+          </p:nvPr>
+        </p:nvSpPr>
+        <p:spPr/>
+        <p:txBody>
+          <a:bodyPr/>
+          <a:lstStyle/>
+          <a:p>
+            <a:r>
+              <a:rPr lang="en-US" dirty="0" err="1" smtClean="0"/>
+              <a:t>Descriptives</a:t>
+            </a:r>
+            <a:r>
+              <a:rPr lang="en-US" dirty="0" smtClean="0"/>
+              <a:t>, Correlations, reliability, </a:t>
+            </a:r>
+            <a:br>
+              <a:rPr lang="en-US" dirty="0" smtClean="0"/>
+            </a:br>
+            <a:r>
+              <a:rPr lang="en-US" dirty="0" smtClean="0"/>
+              <a:t>and t-tests</a:t>
+            </a:r>
+            <a:endParaRPr lang="en-US" dirty="0"/>
+          </a:p>
+        </p:txBody>
+      </p:sp>
+      <p:sp>
+        <p:nvSpPr>
+          <p:cNvPr id="3" name="Content Placeholder 2"/>
+          <p:cNvSpPr>
+            <a:spLocks noGrp="1"/>
+          </p:cNvSpPr>
+          <p:nvPr>
+            <p:ph idx="1"/>
+          </p:nvPr>
+        </p:nvSpPr>
+        <p:spPr/>
+        <p:txBody>
+          <a:bodyPr/>
+          <a:lstStyle/>
+          <a:p>
+            <a:r>
+              <a:rPr lang="en-US" dirty="0" smtClean="0"/>
+              <a:t>The package called “psych”</a:t>
+            </a:r>
+            <a:endParaRPr lang="en-US" dirty="0"/>
+          </a:p>
+        </p:txBody>
+      </p:sp>
+    </p:spTree>
+    <p:extLst>
+      <p:ext uri="{BB962C8B-B14F-4D97-AF65-F5344CB8AC3E}">
+        <p14:creationId xmlns:p14="http://schemas.microsoft.com/office/powerpoint/2010/main" val="2086588469"/>
+      </p:ext>
+    </p:extLst>
+  </p:cSld>
+  <p:clrMapOvr>
+    <a:masterClrMapping/>
+  </p:clrMapOvr>
+</p:sld>
+</file>
+
 <file path=ppt/slides/slide2.xml><?xml version="1.0" encoding="utf-8"?>
 <p:sld xmlns:a="http://schemas.openxmlformats.org/drawingml/2006/main" xmlns:r="http://schemas.openxmlformats.org/officeDocument/2006/relationships" xmlns:p="http://schemas.openxmlformats.org/presentationml/2006/main">
   <p:cSld>
@@ -4349,11 +5198,7 @@
           <a:p>
             <a:r>
               <a:rPr lang="en-US" dirty="0" smtClean="0"/>
-              <a:t>Day </a:t>
-            </a:r>
-            <a:r>
-              <a:rPr lang="en-US" dirty="0" smtClean="0"/>
-              <a:t>2</a:t>
+              <a:t>Day 2</a:t>
             </a:r>
             <a:endParaRPr lang="en-US" dirty="0"/>
           </a:p>
@@ -4438,7 +5283,6 @@
               <a:rPr lang="en-US" dirty="0" smtClean="0"/>
               <a:t>Path Analysis and SEM</a:t>
             </a:r>
-            <a:endParaRPr lang="en-US" dirty="0" smtClean="0"/>
           </a:p>
         </p:txBody>
       </p:sp>
@@ -4633,11 +5477,7 @@
           <a:p>
             <a:r>
               <a:rPr lang="en-US" dirty="0" smtClean="0"/>
-              <a:t>Workshop </a:t>
-            </a:r>
-            <a:r>
-              <a:rPr lang="en-US" dirty="0" smtClean="0"/>
-              <a:t>Materials</a:t>
+              <a:t>Workshop Materials</a:t>
             </a:r>
             <a:endParaRPr lang="en-US" dirty="0"/>
           </a:p>
@@ -4897,8 +5737,12 @@
               <a:t>Data </a:t>
             </a:r>
             <a:r>
+              <a:rPr lang="en-US" dirty="0"/>
+              <a:t>C</a:t>
+            </a:r>
+            <a:r>
               <a:rPr lang="en-US" dirty="0" smtClean="0"/>
-              <a:t>cleaning</a:t>
+              <a:t>leaning</a:t>
             </a:r>
             <a:endParaRPr lang="en-US" dirty="0"/>
           </a:p>
@@ -4919,10 +5763,99 @@
           <a:bodyPr/>
           <a:lstStyle/>
           <a:p>
+            <a:r>
+              <a:rPr lang="en-US" dirty="0" smtClean="0"/>
+              <a:t>The package we’ll use for data cleaning is called </a:t>
+            </a:r>
             <a:r>
               <a:rPr lang="en-US" dirty="0" err="1" smtClean="0"/>
               <a:t>dplyr</a:t>
             </a:r>
+            <a:r>
+              <a:rPr lang="en-US" dirty="0" smtClean="0"/>
+              <a:t>. </a:t>
+            </a:r>
+          </a:p>
+          <a:p>
+            <a:endParaRPr lang="en-US" sz="1200" dirty="0"/>
+          </a:p>
+          <a:p>
+            <a:r>
+              <a:rPr lang="en-US" dirty="0" smtClean="0"/>
+              <a:t>The Verbs</a:t>
+            </a:r>
+          </a:p>
+          <a:p>
+            <a:pPr lvl="1"/>
+            <a:r>
+              <a:rPr lang="en-US" dirty="0" smtClean="0"/>
+              <a:t>filter()</a:t>
+            </a:r>
+          </a:p>
+          <a:p>
+            <a:pPr lvl="1"/>
+            <a:r>
+              <a:rPr lang="en-US" dirty="0" smtClean="0"/>
+              <a:t>mutate()</a:t>
+            </a:r>
+          </a:p>
+          <a:p>
+            <a:pPr lvl="1"/>
+            <a:r>
+              <a:rPr lang="en-US" dirty="0" smtClean="0"/>
+              <a:t>rename()</a:t>
+            </a:r>
+          </a:p>
+          <a:p>
+            <a:pPr lvl="1"/>
+            <a:r>
+              <a:rPr lang="en-US" dirty="0"/>
+              <a:t>a</a:t>
+            </a:r>
+            <a:r>
+              <a:rPr lang="en-US" dirty="0" smtClean="0"/>
+              <a:t>rrange() </a:t>
+            </a:r>
+          </a:p>
+          <a:p>
+            <a:pPr lvl="1"/>
+            <a:r>
+              <a:rPr lang="en-US" dirty="0"/>
+              <a:t>s</a:t>
+            </a:r>
+            <a:r>
+              <a:rPr lang="en-US" dirty="0" smtClean="0"/>
+              <a:t>elect()</a:t>
+            </a:r>
+          </a:p>
+          <a:p>
+            <a:pPr lvl="1"/>
+            <a:r>
+              <a:rPr lang="en-US" dirty="0"/>
+              <a:t>s</a:t>
+            </a:r>
+            <a:r>
+              <a:rPr lang="en-US" dirty="0" smtClean="0"/>
+              <a:t>ummarize()</a:t>
+            </a:r>
+          </a:p>
+          <a:p>
+            <a:pPr lvl="1"/>
+            <a:r>
+              <a:rPr lang="en-US" dirty="0" err="1"/>
+              <a:t>g</a:t>
+            </a:r>
+            <a:r>
+              <a:rPr lang="en-US" dirty="0" err="1" smtClean="0"/>
+              <a:t>roup_by</a:t>
+            </a:r>
+            <a:r>
+              <a:rPr lang="en-US" dirty="0" smtClean="0"/>
+              <a:t>()</a:t>
+            </a:r>
+          </a:p>
+          <a:p>
+            <a:pPr lvl="1"/>
             <a:endParaRPr lang="en-US" dirty="0"/>
           </a:p>
         </p:txBody>
@@ -4974,7 +5907,7 @@
           <a:p>
             <a:r>
               <a:rPr lang="en-US" dirty="0" smtClean="0"/>
-              <a:t>Making Basic Figures</a:t>
+              <a:t>Data Cleaning</a:t>
             </a:r>
             <a:endParaRPr lang="en-US" dirty="0"/>
           </a:p>
@@ -4997,16 +5930,471 @@
           <a:p>
             <a:r>
               <a:rPr lang="en-US" dirty="0" smtClean="0"/>
-              <a:t>ggplot2</a:t>
-            </a:r>
+              <a:t>Each verb performs familiar operations of a dataset</a:t>
+            </a:r>
+          </a:p>
+          <a:p>
             <a:endParaRPr lang="en-US" dirty="0"/>
           </a:p>
-        </p:txBody>
-      </p:sp>
+          <a:p>
+            <a:endParaRPr lang="en-US" dirty="0"/>
+          </a:p>
+        </p:txBody>
+      </p:sp>
+      <p:graphicFrame>
+        <p:nvGraphicFramePr>
+          <p:cNvPr id="4" name="Table 3"/>
+          <p:cNvGraphicFramePr>
+            <a:graphicFrameLocks noGrp="1"/>
+          </p:cNvGraphicFramePr>
+          <p:nvPr>
+            <p:extLst>
+              <p:ext uri="{D42A27DB-BD31-4B8C-83A1-F6EECF244321}">
+                <p14:modId xmlns:p14="http://schemas.microsoft.com/office/powerpoint/2010/main" val="959252831"/>
+              </p:ext>
+            </p:extLst>
+          </p:nvPr>
+        </p:nvGraphicFramePr>
+        <p:xfrm>
+          <a:off x="1142999" y="3075389"/>
+          <a:ext cx="9872871" cy="2692242"/>
+        </p:xfrm>
+        <a:graphic>
+          <a:graphicData uri="http://schemas.openxmlformats.org/drawingml/2006/table">
+            <a:tbl>
+              <a:tblPr firstRow="1" bandRow="1">
+                <a:tableStyleId>{2D5ABB26-0587-4C30-8999-92F81FD0307C}</a:tableStyleId>
+              </a:tblPr>
+              <a:tblGrid>
+                <a:gridCol w="1649628"/>
+                <a:gridCol w="4485503"/>
+                <a:gridCol w="3737740"/>
+              </a:tblGrid>
+              <a:tr h="381572">
+                <a:tc>
+                  <a:txBody>
+                    <a:bodyPr/>
+                    <a:lstStyle/>
+                    <a:p>
+                      <a:r>
+                        <a:rPr lang="en-US" dirty="0" smtClean="0"/>
+                        <a:t>Verb</a:t>
+                      </a:r>
+                      <a:endParaRPr lang="en-US" dirty="0"/>
+                    </a:p>
+                  </a:txBody>
+                  <a:tcPr>
+                    <a:lnB w="12700" cap="flat" cmpd="sng" algn="ctr">
+                      <a:solidFill>
+                        <a:schemeClr val="tx1"/>
+                      </a:solidFill>
+                      <a:prstDash val="solid"/>
+                      <a:round/>
+                      <a:headEnd type="none" w="med" len="med"/>
+                      <a:tailEnd type="none" w="med" len="med"/>
+                    </a:lnB>
+                  </a:tcPr>
+                </a:tc>
+                <a:tc>
+                  <a:txBody>
+                    <a:bodyPr/>
+                    <a:lstStyle/>
+                    <a:p>
+                      <a:r>
+                        <a:rPr lang="en-US" dirty="0" smtClean="0"/>
+                        <a:t>What is does</a:t>
+                      </a:r>
+                      <a:endParaRPr lang="en-US" dirty="0"/>
+                    </a:p>
+                  </a:txBody>
+                  <a:tcPr>
+                    <a:lnB w="12700" cap="flat" cmpd="sng" algn="ctr">
+                      <a:solidFill>
+                        <a:schemeClr val="tx1"/>
+                      </a:solidFill>
+                      <a:prstDash val="solid"/>
+                      <a:round/>
+                      <a:headEnd type="none" w="med" len="med"/>
+                      <a:tailEnd type="none" w="med" len="med"/>
+                    </a:lnB>
+                  </a:tcPr>
+                </a:tc>
+                <a:tc>
+                  <a:txBody>
+                    <a:bodyPr/>
+                    <a:lstStyle/>
+                    <a:p>
+                      <a:r>
+                        <a:rPr lang="mr-IN" dirty="0" smtClean="0"/>
+                        <a:t>…</a:t>
+                      </a:r>
+                      <a:r>
+                        <a:rPr lang="en-US" dirty="0" smtClean="0"/>
+                        <a:t>in SPSS</a:t>
+                      </a:r>
+                      <a:endParaRPr lang="en-US" dirty="0"/>
+                    </a:p>
+                  </a:txBody>
+                  <a:tcPr>
+                    <a:lnB w="12700" cap="flat" cmpd="sng" algn="ctr">
+                      <a:solidFill>
+                        <a:schemeClr val="tx1"/>
+                      </a:solidFill>
+                      <a:prstDash val="solid"/>
+                      <a:round/>
+                      <a:headEnd type="none" w="med" len="med"/>
+                      <a:tailEnd type="none" w="med" len="med"/>
+                    </a:lnB>
+                  </a:tcPr>
+                </a:tc>
+              </a:tr>
+              <a:tr h="381572">
+                <a:tc>
+                  <a:txBody>
+                    <a:bodyPr/>
+                    <a:lstStyle/>
+                    <a:p>
+                      <a:r>
+                        <a:rPr lang="en-US" dirty="0" smtClean="0"/>
+                        <a:t>mutate()</a:t>
+                      </a:r>
+                      <a:endParaRPr lang="en-US" dirty="0"/>
+                    </a:p>
+                  </a:txBody>
+                  <a:tcPr>
+                    <a:lnT w="12700" cap="flat" cmpd="sng" algn="ctr">
+                      <a:solidFill>
+                        <a:schemeClr val="tx1"/>
+                      </a:solidFill>
+                      <a:prstDash val="solid"/>
+                      <a:round/>
+                      <a:headEnd type="none" w="med" len="med"/>
+                      <a:tailEnd type="none" w="med" len="med"/>
+                    </a:lnT>
+                  </a:tcPr>
+                </a:tc>
+                <a:tc>
+                  <a:txBody>
+                    <a:bodyPr/>
+                    <a:lstStyle/>
+                    <a:p>
+                      <a:r>
+                        <a:rPr lang="en-US" dirty="0" smtClean="0"/>
+                        <a:t>Creates new variables</a:t>
+                      </a:r>
+                      <a:endParaRPr lang="en-US" dirty="0"/>
+                    </a:p>
+                  </a:txBody>
+                  <a:tcPr>
+                    <a:lnT w="12700" cap="flat" cmpd="sng" algn="ctr">
+                      <a:solidFill>
+                        <a:schemeClr val="tx1"/>
+                      </a:solidFill>
+                      <a:prstDash val="solid"/>
+                      <a:round/>
+                      <a:headEnd type="none" w="med" len="med"/>
+                      <a:tailEnd type="none" w="med" len="med"/>
+                    </a:lnT>
+                  </a:tcPr>
+                </a:tc>
+                <a:tc>
+                  <a:txBody>
+                    <a:bodyPr/>
+                    <a:lstStyle/>
+                    <a:p>
+                      <a:r>
+                        <a:rPr lang="en-US" dirty="0" smtClean="0"/>
+                        <a:t>COMPUTE</a:t>
+                      </a:r>
+                      <a:r>
+                        <a:rPr lang="en-US" baseline="0" dirty="0" smtClean="0"/>
+                        <a:t> (or transform in menu)</a:t>
+                      </a:r>
+                      <a:endParaRPr lang="en-US" dirty="0"/>
+                    </a:p>
+                  </a:txBody>
+                  <a:tcPr>
+                    <a:lnT w="12700" cap="flat" cmpd="sng" algn="ctr">
+                      <a:solidFill>
+                        <a:schemeClr val="tx1"/>
+                      </a:solidFill>
+                      <a:prstDash val="solid"/>
+                      <a:round/>
+                      <a:headEnd type="none" w="med" len="med"/>
+                      <a:tailEnd type="none" w="med" len="med"/>
+                    </a:lnT>
+                  </a:tcPr>
+                </a:tc>
+              </a:tr>
+              <a:tr h="381572">
+                <a:tc>
+                  <a:txBody>
+                    <a:bodyPr/>
+                    <a:lstStyle/>
+                    <a:p>
+                      <a:r>
+                        <a:rPr lang="en-US" dirty="0" smtClean="0"/>
+                        <a:t>filter()</a:t>
+                      </a:r>
+                      <a:endParaRPr lang="en-US" dirty="0"/>
+                    </a:p>
+                  </a:txBody>
+                  <a:tcPr/>
+                </a:tc>
+                <a:tc>
+                  <a:txBody>
+                    <a:bodyPr/>
+                    <a:lstStyle/>
+                    <a:p>
+                      <a:r>
+                        <a:rPr lang="en-US" dirty="0" smtClean="0"/>
+                        <a:t>Filters</a:t>
+                      </a:r>
+                      <a:r>
+                        <a:rPr lang="en-US" baseline="0" dirty="0" smtClean="0"/>
+                        <a:t> for specific cases</a:t>
+                      </a:r>
+                      <a:endParaRPr lang="en-US" dirty="0"/>
+                    </a:p>
+                  </a:txBody>
+                  <a:tcPr/>
+                </a:tc>
+                <a:tc>
+                  <a:txBody>
+                    <a:bodyPr/>
+                    <a:lstStyle/>
+                    <a:p>
+                      <a:r>
+                        <a:rPr lang="en-US" dirty="0" smtClean="0"/>
+                        <a:t>FILTER</a:t>
+                      </a:r>
+                      <a:r>
+                        <a:rPr lang="en-US" baseline="0" dirty="0" smtClean="0"/>
+                        <a:t> (or select data in menu)</a:t>
+                      </a:r>
+                      <a:endParaRPr lang="en-US" dirty="0"/>
+                    </a:p>
+                  </a:txBody>
+                  <a:tcPr/>
+                </a:tc>
+              </a:tr>
+              <a:tr h="381572">
+                <a:tc>
+                  <a:txBody>
+                    <a:bodyPr/>
+                    <a:lstStyle/>
+                    <a:p>
+                      <a:r>
+                        <a:rPr lang="en-US" dirty="0" smtClean="0"/>
+                        <a:t>arrange()</a:t>
+                      </a:r>
+                      <a:endParaRPr lang="en-US" dirty="0"/>
+                    </a:p>
+                  </a:txBody>
+                  <a:tcPr/>
+                </a:tc>
+                <a:tc>
+                  <a:txBody>
+                    <a:bodyPr/>
+                    <a:lstStyle/>
+                    <a:p>
+                      <a:r>
+                        <a:rPr lang="en-US" dirty="0" smtClean="0"/>
+                        <a:t>Sorts using some logic</a:t>
+                      </a:r>
+                      <a:endParaRPr lang="en-US" dirty="0"/>
+                    </a:p>
+                  </a:txBody>
+                  <a:tcPr/>
+                </a:tc>
+                <a:tc>
+                  <a:txBody>
+                    <a:bodyPr/>
+                    <a:lstStyle/>
+                    <a:p>
+                      <a:r>
+                        <a:rPr lang="en-US" dirty="0" smtClean="0"/>
+                        <a:t>SORT</a:t>
+                      </a:r>
+                      <a:endParaRPr lang="en-US" dirty="0"/>
+                    </a:p>
+                  </a:txBody>
+                  <a:tcPr/>
+                </a:tc>
+              </a:tr>
+              <a:tr h="388965">
+                <a:tc>
+                  <a:txBody>
+                    <a:bodyPr/>
+                    <a:lstStyle/>
+                    <a:p>
+                      <a:r>
+                        <a:rPr lang="en-US" dirty="0" smtClean="0"/>
+                        <a:t>select()</a:t>
+                      </a:r>
+                      <a:endParaRPr lang="en-US" dirty="0"/>
+                    </a:p>
+                  </a:txBody>
+                  <a:tcPr/>
+                </a:tc>
+                <a:tc>
+                  <a:txBody>
+                    <a:bodyPr/>
+                    <a:lstStyle/>
+                    <a:p>
+                      <a:r>
+                        <a:rPr lang="en-US" dirty="0" smtClean="0"/>
+                        <a:t>Subsets</a:t>
+                      </a:r>
+                      <a:r>
+                        <a:rPr lang="en-US" baseline="0" dirty="0" smtClean="0"/>
+                        <a:t> for only certain variables</a:t>
+                      </a:r>
+                      <a:endParaRPr lang="en-US" dirty="0"/>
+                    </a:p>
+                  </a:txBody>
+                  <a:tcPr/>
+                </a:tc>
+                <a:tc>
+                  <a:txBody>
+                    <a:bodyPr/>
+                    <a:lstStyle/>
+                    <a:p>
+                      <a:r>
+                        <a:rPr lang="en-US" dirty="0" smtClean="0"/>
+                        <a:t>DROP</a:t>
+                      </a:r>
+                      <a:endParaRPr lang="en-US" dirty="0"/>
+                    </a:p>
+                  </a:txBody>
+                  <a:tcPr/>
+                </a:tc>
+              </a:tr>
+              <a:tr h="395417">
+                <a:tc>
+                  <a:txBody>
+                    <a:bodyPr/>
+                    <a:lstStyle/>
+                    <a:p>
+                      <a:r>
+                        <a:rPr lang="en-US" dirty="0" err="1" smtClean="0"/>
+                        <a:t>group_by</a:t>
+                      </a:r>
+                      <a:r>
+                        <a:rPr lang="en-US" dirty="0" smtClean="0"/>
+                        <a:t>()</a:t>
+                      </a:r>
+                      <a:endParaRPr lang="en-US" dirty="0"/>
+                    </a:p>
+                  </a:txBody>
+                  <a:tcPr/>
+                </a:tc>
+                <a:tc>
+                  <a:txBody>
+                    <a:bodyPr/>
+                    <a:lstStyle/>
+                    <a:p>
+                      <a:r>
+                        <a:rPr lang="en-US" dirty="0" smtClean="0"/>
+                        <a:t>Groups</a:t>
+                      </a:r>
+                      <a:r>
+                        <a:rPr lang="en-US" baseline="0" dirty="0" smtClean="0"/>
+                        <a:t> dataset by a categorical variable</a:t>
+                      </a:r>
+                      <a:endParaRPr lang="en-US" dirty="0"/>
+                    </a:p>
+                  </a:txBody>
+                  <a:tcPr/>
+                </a:tc>
+                <a:tc>
+                  <a:txBody>
+                    <a:bodyPr/>
+                    <a:lstStyle/>
+                    <a:p>
+                      <a:r>
+                        <a:rPr lang="en-US" dirty="0" smtClean="0"/>
+                        <a:t>Like split file in menu</a:t>
+                      </a:r>
+                      <a:endParaRPr lang="en-US" dirty="0"/>
+                    </a:p>
+                  </a:txBody>
+                  <a:tcPr/>
+                </a:tc>
+              </a:tr>
+              <a:tr h="381572">
+                <a:tc>
+                  <a:txBody>
+                    <a:bodyPr/>
+                    <a:lstStyle/>
+                    <a:p>
+                      <a:r>
+                        <a:rPr lang="en-US" dirty="0" smtClean="0"/>
+                        <a:t>summarize()</a:t>
+                      </a:r>
+                      <a:endParaRPr lang="en-US" dirty="0"/>
+                    </a:p>
+                  </a:txBody>
+                  <a:tcPr/>
+                </a:tc>
+                <a:tc>
+                  <a:txBody>
+                    <a:bodyPr/>
+                    <a:lstStyle/>
+                    <a:p>
+                      <a:r>
+                        <a:rPr lang="en-US" dirty="0" smtClean="0"/>
+                        <a:t>Create a summary table</a:t>
+                      </a:r>
+                      <a:endParaRPr lang="en-US" dirty="0"/>
+                    </a:p>
+                  </a:txBody>
+                  <a:tcPr/>
+                </a:tc>
+                <a:tc>
+                  <a:txBody>
+                    <a:bodyPr/>
+                    <a:lstStyle/>
+                    <a:p>
+                      <a:pPr marL="0" marR="0" indent="0" algn="l" defTabSz="914400" rtl="0" eaLnBrk="1" fontAlgn="auto" latinLnBrk="0" hangingPunct="1">
+                        <a:lnSpc>
+                          <a:spcPct val="100000"/>
+                        </a:lnSpc>
+                        <a:spcBef>
+                          <a:spcPts val="0"/>
+                        </a:spcBef>
+                        <a:spcAft>
+                          <a:spcPts val="0"/>
+                        </a:spcAft>
+                        <a:buClrTx/>
+                        <a:buSzTx/>
+                        <a:buFontTx/>
+                        <a:buNone/>
+                        <a:tabLst/>
+                        <a:defRPr/>
+                      </a:pPr>
+                      <a:r>
+                        <a:rPr lang="en-US" dirty="0" smtClean="0"/>
+                        <a:t>Descriptive</a:t>
+                      </a:r>
+                      <a:r>
+                        <a:rPr lang="en-US" baseline="0" dirty="0" smtClean="0"/>
+                        <a:t> statistics</a:t>
+                      </a:r>
+                      <a:endParaRPr lang="en-US" dirty="0" smtClean="0"/>
+                    </a:p>
+                  </a:txBody>
+                  <a:tcPr/>
+                </a:tc>
+              </a:tr>
+            </a:tbl>
+          </a:graphicData>
+        </a:graphic>
+      </p:graphicFrame>
     </p:spTree>
     <p:extLst>
       <p:ext uri="{BB962C8B-B14F-4D97-AF65-F5344CB8AC3E}">
-        <p14:creationId xmlns:p14="http://schemas.microsoft.com/office/powerpoint/2010/main" val="332671968"/>
+        <p14:creationId xmlns:p14="http://schemas.microsoft.com/office/powerpoint/2010/main" val="427432247"/>
       </p:ext>
     </p:extLst>
   </p:cSld>
@@ -5049,43 +6437,110 @@
           <a:lstStyle/>
           <a:p>
             <a:r>
-              <a:rPr lang="en-US" dirty="0" err="1" smtClean="0"/>
-              <a:t>Descriptives</a:t>
-            </a:r>
-            <a:r>
               <a:rPr lang="en-US" dirty="0" smtClean="0"/>
-              <a:t>, Correlations, reliability, </a:t>
-            </a:r>
-            <a:br>
+              <a:t>Data Cleaning</a:t>
+            </a:r>
+            <a:endParaRPr lang="en-US" dirty="0"/>
+          </a:p>
+        </p:txBody>
+      </p:sp>
+      <p:sp>
+        <p:nvSpPr>
+          <p:cNvPr id="3" name="Content Placeholder 2"/>
+          <p:cNvSpPr>
+            <a:spLocks noGrp="1"/>
+          </p:cNvSpPr>
+          <p:nvPr>
+            <p:ph idx="1"/>
+          </p:nvPr>
+        </p:nvSpPr>
+        <p:spPr/>
+        <p:txBody>
+          <a:bodyPr/>
+          <a:lstStyle/>
+          <a:p>
+            <a:r>
               <a:rPr lang="en-US" dirty="0" smtClean="0"/>
-            </a:br>
+              <a:t>We will use the pipe operator to combine verbs!</a:t>
+            </a:r>
+          </a:p>
+          <a:p>
+            <a:pPr marL="45720" indent="0">
+              <a:buNone/>
+            </a:pPr>
             <a:r>
               <a:rPr lang="en-US" dirty="0" smtClean="0"/>
-              <a:t>and t-tests</a:t>
-            </a:r>
-            <a:endParaRPr lang="en-US" dirty="0"/>
-          </a:p>
-        </p:txBody>
-      </p:sp>
-      <p:sp>
-        <p:nvSpPr>
-          <p:cNvPr id="3" name="Content Placeholder 2"/>
-          <p:cNvSpPr>
-            <a:spLocks noGrp="1"/>
-          </p:cNvSpPr>
-          <p:nvPr>
-            <p:ph idx="1"/>
-          </p:nvPr>
-        </p:nvSpPr>
-        <p:spPr/>
-        <p:txBody>
-          <a:bodyPr/>
-          <a:lstStyle/>
-          <a:p>
+              <a:t> </a:t>
+            </a:r>
+          </a:p>
+          <a:p>
+            <a:r>
+              <a:rPr lang="en-US" u="sng" dirty="0" smtClean="0"/>
+              <a:t>The pipe:</a:t>
+            </a:r>
+          </a:p>
+          <a:p>
+            <a:pPr marL="45720" indent="0" algn="ctr">
+              <a:buNone/>
+            </a:pPr>
+            <a:r>
+              <a:rPr lang="en-US" sz="6000" dirty="0" smtClean="0"/>
+              <a:t>%&gt;%</a:t>
+            </a:r>
+          </a:p>
+          <a:p>
+            <a:pPr marL="45720" indent="0">
+              <a:buNone/>
+            </a:pPr>
+            <a:r>
+              <a:rPr lang="en-US" b="1" dirty="0" smtClean="0"/>
+              <a:t>filter(dataset, age &gt;= 18) </a:t>
+            </a:r>
+          </a:p>
+          <a:p>
+            <a:pPr marL="45720" indent="0">
+              <a:buNone/>
+            </a:pPr>
+            <a:r>
+              <a:rPr lang="en-US" dirty="0"/>
+              <a:t>	</a:t>
+            </a:r>
             <a:r>
               <a:rPr lang="en-US" dirty="0" smtClean="0"/>
-              <a:t>The package called “psych”</a:t>
-            </a:r>
+              <a:t>	</a:t>
+            </a:r>
+            <a:r>
+              <a:rPr lang="mr-IN" dirty="0" smtClean="0"/>
+              <a:t>…</a:t>
+            </a:r>
+            <a:r>
+              <a:rPr lang="en-US" dirty="0" smtClean="0"/>
+              <a:t>is the same as:</a:t>
+            </a:r>
+          </a:p>
+          <a:p>
+            <a:pPr marL="45720" indent="0">
+              <a:buNone/>
+            </a:pPr>
+            <a:r>
+              <a:rPr lang="en-US" b="1" dirty="0" smtClean="0"/>
+              <a:t>dataset </a:t>
+            </a:r>
+            <a:r>
+              <a:rPr lang="en-US" b="1" dirty="0" smtClean="0">
+                <a:solidFill>
+                  <a:srgbClr val="7030A0"/>
+                </a:solidFill>
+              </a:rPr>
+              <a:t>%&gt;%</a:t>
+            </a:r>
+            <a:r>
+              <a:rPr lang="en-US" b="1" dirty="0" smtClean="0"/>
+              <a:t> filter(age &gt;= 18)</a:t>
+            </a:r>
+            <a:endParaRPr lang="en-US" b="1" dirty="0"/>
+          </a:p>
+          <a:p>
             <a:endParaRPr lang="en-US" dirty="0"/>
           </a:p>
         </p:txBody>
@@ -5093,7 +6548,7 @@
     </p:spTree>
     <p:extLst>
       <p:ext uri="{BB962C8B-B14F-4D97-AF65-F5344CB8AC3E}">
-        <p14:creationId xmlns:p14="http://schemas.microsoft.com/office/powerpoint/2010/main" val="2086588469"/>
+        <p14:creationId xmlns:p14="http://schemas.microsoft.com/office/powerpoint/2010/main" val="482780044"/>
       </p:ext>
     </p:extLst>
   </p:cSld>

</xml_diff>

<commit_message>
ggplot rmd and slides
</commit_message>
<xml_diff>
--- a/docs/Day 1 Slides.pptx
+++ b/docs/Day 1 Slides.pptx
@@ -5,7 +5,7 @@
     <p:sldMasterId id="2147483672" r:id="rId1"/>
   </p:sldMasterIdLst>
   <p:notesMasterIdLst>
-    <p:notesMasterId r:id="rId17"/>
+    <p:notesMasterId r:id="rId29"/>
   </p:notesMasterIdLst>
   <p:sldIdLst>
     <p:sldId id="256" r:id="rId2"/>
@@ -22,7 +22,19 @@
     <p:sldId id="390" r:id="rId13"/>
     <p:sldId id="387" r:id="rId14"/>
     <p:sldId id="383" r:id="rId15"/>
-    <p:sldId id="384" r:id="rId16"/>
+    <p:sldId id="392" r:id="rId16"/>
+    <p:sldId id="393" r:id="rId17"/>
+    <p:sldId id="394" r:id="rId18"/>
+    <p:sldId id="395" r:id="rId19"/>
+    <p:sldId id="397" r:id="rId20"/>
+    <p:sldId id="396" r:id="rId21"/>
+    <p:sldId id="398" r:id="rId22"/>
+    <p:sldId id="400" r:id="rId23"/>
+    <p:sldId id="401" r:id="rId24"/>
+    <p:sldId id="391" r:id="rId25"/>
+    <p:sldId id="384" r:id="rId26"/>
+    <p:sldId id="402" r:id="rId27"/>
+    <p:sldId id="403" r:id="rId28"/>
   </p:sldIdLst>
   <p:sldSz cx="12192000" cy="6858000"/>
   <p:notesSz cx="6858000" cy="9144000"/>
@@ -211,7 +223,7 @@
           <a:p>
             <a:fld id="{C1BA31B9-3973-47BB-A769-C9355840A371}" type="datetimeFigureOut">
               <a:rPr lang="en-US" smtClean="0"/>
-              <a:t>7/11/17</a:t>
+              <a:t>7/12/17</a:t>
             </a:fld>
             <a:endParaRPr lang="en-US"/>
           </a:p>
@@ -675,7 +687,7 @@
           <a:p>
             <a:fld id="{90187E87-00B9-445A-8D49-C5EA21AFF997}" type="datetime1">
               <a:rPr lang="en-US" smtClean="0"/>
-              <a:t>7/11/17</a:t>
+              <a:t>7/12/17</a:t>
             </a:fld>
             <a:endParaRPr lang="en-US"/>
           </a:p>
@@ -896,7 +908,7 @@
           <a:p>
             <a:fld id="{096F9D19-0B27-4869-88F9-365098868A7F}" type="datetime1">
               <a:rPr lang="en-US" smtClean="0"/>
-              <a:t>7/11/17</a:t>
+              <a:t>7/12/17</a:t>
             </a:fld>
             <a:endParaRPr lang="en-US"/>
           </a:p>
@@ -1076,7 +1088,7 @@
           <a:p>
             <a:fld id="{AD3B7F37-9439-40A1-AEEF-AD67BB0D4AAC}" type="datetime1">
               <a:rPr lang="en-US" smtClean="0"/>
-              <a:t>7/11/17</a:t>
+              <a:t>7/12/17</a:t>
             </a:fld>
             <a:endParaRPr lang="en-US"/>
           </a:p>
@@ -1325,7 +1337,7 @@
             </a:pPr>
             <a:fld id="{68164054-3012-482D-9EB5-FE9FE872DCFE}" type="datetime1">
               <a:rPr lang="en-US" smtClean="0"/>
-              <a:t>7/11/17</a:t>
+              <a:t>7/12/17</a:t>
             </a:fld>
             <a:endParaRPr lang="en-US"/>
           </a:p>
@@ -1522,7 +1534,7 @@
           <a:p>
             <a:fld id="{6186BA2A-CEBF-4FAC-A01D-170852E3EB13}" type="datetime1">
               <a:rPr lang="en-US" smtClean="0"/>
-              <a:t>7/11/17</a:t>
+              <a:t>7/12/17</a:t>
             </a:fld>
             <a:endParaRPr lang="en-US"/>
           </a:p>
@@ -1780,7 +1792,7 @@
           <a:p>
             <a:fld id="{B5212E68-AB57-4F56-9514-81BEE86EE853}" type="datetime1">
               <a:rPr lang="en-US" smtClean="0"/>
-              <a:t>7/11/17</a:t>
+              <a:t>7/12/17</a:t>
             </a:fld>
             <a:endParaRPr lang="en-US"/>
           </a:p>
@@ -2103,7 +2115,7 @@
           <a:p>
             <a:fld id="{E41FD155-039D-4424-A31E-3636442F6E36}" type="datetime1">
               <a:rPr lang="en-US" smtClean="0"/>
-              <a:t>7/11/17</a:t>
+              <a:t>7/12/17</a:t>
             </a:fld>
             <a:endParaRPr lang="en-US"/>
           </a:p>
@@ -2527,7 +2539,7 @@
           <a:p>
             <a:fld id="{64126646-2279-486A-B40D-6145D7D6D51B}" type="datetime1">
               <a:rPr lang="en-US" smtClean="0"/>
-              <a:t>7/11/17</a:t>
+              <a:t>7/12/17</a:t>
             </a:fld>
             <a:endParaRPr lang="en-US"/>
           </a:p>
@@ -2645,7 +2657,7 @@
           <a:p>
             <a:fld id="{EB0B8D8C-4F8E-4FB9-992A-BE6AEAF72144}" type="datetime1">
               <a:rPr lang="en-US" smtClean="0"/>
-              <a:t>7/11/17</a:t>
+              <a:t>7/12/17</a:t>
             </a:fld>
             <a:endParaRPr lang="en-US"/>
           </a:p>
@@ -2740,7 +2752,7 @@
           <a:p>
             <a:fld id="{535ABF41-E07B-4A76-B381-06013911A931}" type="datetime1">
               <a:rPr lang="en-US" smtClean="0"/>
-              <a:t>7/11/17</a:t>
+              <a:t>7/12/17</a:t>
             </a:fld>
             <a:endParaRPr lang="en-US"/>
           </a:p>
@@ -3030,7 +3042,7 @@
           <a:p>
             <a:fld id="{6FC7F623-53E3-4FED-9930-39EA7732EA27}" type="datetime1">
               <a:rPr lang="en-US" smtClean="0"/>
-              <a:t>7/11/17</a:t>
+              <a:t>7/12/17</a:t>
             </a:fld>
             <a:endParaRPr lang="en-US"/>
           </a:p>
@@ -3302,7 +3314,7 @@
           <a:p>
             <a:fld id="{FA00CAC2-29F8-40CA-B143-AB13DA75749C}" type="datetime1">
               <a:rPr lang="en-US" smtClean="0"/>
-              <a:t>7/11/17</a:t>
+              <a:t>7/12/17</a:t>
             </a:fld>
             <a:endParaRPr lang="en-US"/>
           </a:p>
@@ -3556,7 +3568,7 @@
           <a:p>
             <a:fld id="{2E5D7971-9A78-471E-B993-894E22B9485D}" type="datetime1">
               <a:rPr lang="en-US" smtClean="0"/>
-              <a:t>7/11/17</a:t>
+              <a:t>7/12/17</a:t>
             </a:fld>
             <a:endParaRPr lang="en-US"/>
           </a:p>
@@ -4850,7 +4862,11 @@
           <a:p>
             <a:r>
               <a:rPr lang="en-US" dirty="0" smtClean="0"/>
-              <a:t>Making Basic Figures</a:t>
+              <a:t>Making </a:t>
+            </a:r>
+            <a:r>
+              <a:rPr lang="en-US" dirty="0" smtClean="0"/>
+              <a:t>Figures with ggplot2</a:t>
             </a:r>
             <a:endParaRPr lang="en-US" dirty="0"/>
           </a:p>
@@ -4873,7 +4889,83 @@
           <a:p>
             <a:r>
               <a:rPr lang="en-US" dirty="0" smtClean="0"/>
-              <a:t>ggplot2</a:t>
+              <a:t>As with everything else, there are lots of ways to make figures in R</a:t>
+            </a:r>
+          </a:p>
+          <a:p>
+            <a:pPr lvl="1"/>
+            <a:r>
+              <a:rPr lang="en-US" dirty="0" smtClean="0"/>
+              <a:t>Base R</a:t>
+            </a:r>
+          </a:p>
+          <a:p>
+            <a:pPr lvl="1"/>
+            <a:r>
+              <a:rPr lang="en-US" dirty="0" smtClean="0"/>
+              <a:t>Lattice graphics</a:t>
+            </a:r>
+            <a:endParaRPr lang="en-US" dirty="0"/>
+          </a:p>
+          <a:p>
+            <a:pPr lvl="1"/>
+            <a:r>
+              <a:rPr lang="en-US" dirty="0" smtClean="0"/>
+              <a:t>The g</a:t>
+            </a:r>
+            <a:r>
+              <a:rPr lang="en-US" dirty="0" smtClean="0"/>
+              <a:t>gplot2 package</a:t>
+            </a:r>
+          </a:p>
+          <a:p>
+            <a:pPr lvl="1"/>
+            <a:endParaRPr lang="en-US" dirty="0"/>
+          </a:p>
+          <a:p>
+            <a:r>
+              <a:rPr lang="en-US" dirty="0" smtClean="0"/>
+              <a:t>We’ll be learning the ggplot2 package. </a:t>
+            </a:r>
+          </a:p>
+          <a:p>
+            <a:pPr lvl="1"/>
+            <a:r>
+              <a:rPr lang="en-US" dirty="0" smtClean="0"/>
+              <a:t>It makes beautiful visualizations</a:t>
+            </a:r>
+          </a:p>
+          <a:p>
+            <a:pPr lvl="1"/>
+            <a:r>
+              <a:rPr lang="en-US" dirty="0" smtClean="0"/>
+              <a:t>It’s popular so there is a lot of help on the internet and companion code</a:t>
+            </a:r>
+          </a:p>
+          <a:p>
+            <a:pPr lvl="1"/>
+            <a:r>
+              <a:rPr lang="en-US" dirty="0" smtClean="0"/>
+              <a:t>Written by the same person who wrote </a:t>
+            </a:r>
+            <a:r>
+              <a:rPr lang="en-US" dirty="0" err="1" smtClean="0"/>
+              <a:t>dplyr</a:t>
+            </a:r>
+            <a:r>
+              <a:rPr lang="en-US" dirty="0"/>
+              <a:t> </a:t>
+            </a:r>
+            <a:r>
+              <a:rPr lang="en-US" dirty="0" smtClean="0"/>
+              <a:t>and it works at the end of a pipeline</a:t>
+            </a:r>
+          </a:p>
+          <a:p>
+            <a:pPr lvl="1"/>
+            <a:r>
+              <a:rPr lang="en-US" dirty="0" smtClean="0"/>
+              <a:t>It is what Smith students know how to use</a:t>
             </a:r>
             <a:endParaRPr lang="en-US" dirty="0"/>
           </a:p>
@@ -4925,51 +5017,625 @@
           <a:lstStyle/>
           <a:p>
             <a:r>
+              <a:rPr lang="en-US" dirty="0" smtClean="0"/>
+              <a:t>Making Figures with ggplot2</a:t>
+            </a:r>
+            <a:endParaRPr lang="en-US" dirty="0"/>
+          </a:p>
+        </p:txBody>
+      </p:sp>
+      <p:sp>
+        <p:nvSpPr>
+          <p:cNvPr id="3" name="Content Placeholder 2"/>
+          <p:cNvSpPr>
+            <a:spLocks noGrp="1"/>
+          </p:cNvSpPr>
+          <p:nvPr>
+            <p:ph idx="1"/>
+          </p:nvPr>
+        </p:nvSpPr>
+        <p:spPr>
+          <a:xfrm>
+            <a:off x="1143000" y="2057400"/>
+            <a:ext cx="7086599" cy="4038600"/>
+          </a:xfrm>
+        </p:spPr>
+        <p:txBody>
+          <a:bodyPr/>
+          <a:lstStyle/>
+          <a:p>
+            <a:r>
+              <a:rPr lang="en-US" dirty="0" smtClean="0"/>
+              <a:t>The easiest figures are made with the </a:t>
+            </a:r>
+            <a:r>
               <a:rPr lang="en-US" dirty="0" err="1" smtClean="0"/>
-              <a:t>Descriptives</a:t>
-            </a:r>
-            <a:r>
-              <a:rPr lang="en-US" dirty="0" smtClean="0"/>
-              <a:t>, Correlations, reliability, </a:t>
-            </a:r>
-            <a:br>
-              <a:rPr lang="en-US" dirty="0" smtClean="0"/>
-            </a:br>
-            <a:r>
-              <a:rPr lang="en-US" dirty="0" smtClean="0"/>
-              <a:t>and t-tests</a:t>
-            </a:r>
+              <a:t>qplot</a:t>
+            </a:r>
+            <a:r>
+              <a:rPr lang="en-US" dirty="0" smtClean="0"/>
+              <a:t>() function</a:t>
+            </a:r>
+          </a:p>
+          <a:p>
+            <a:pPr marL="45720" indent="0">
+              <a:buNone/>
+            </a:pPr>
             <a:endParaRPr lang="en-US" dirty="0"/>
           </a:p>
-        </p:txBody>
-      </p:sp>
-      <p:sp>
-        <p:nvSpPr>
-          <p:cNvPr id="3" name="Content Placeholder 2"/>
-          <p:cNvSpPr>
-            <a:spLocks noGrp="1"/>
-          </p:cNvSpPr>
-          <p:nvPr>
-            <p:ph idx="1"/>
-          </p:nvPr>
-        </p:nvSpPr>
-        <p:spPr/>
-        <p:txBody>
-          <a:bodyPr/>
-          <a:lstStyle/>
-          <a:p>
-            <a:r>
-              <a:rPr lang="en-US" dirty="0" smtClean="0"/>
-              <a:t>The package called “psych”</a:t>
-            </a:r>
-            <a:endParaRPr lang="en-US" dirty="0"/>
-          </a:p>
-        </p:txBody>
-      </p:sp>
+          <a:p>
+            <a:pPr marL="45720" indent="0">
+              <a:buNone/>
+            </a:pPr>
+            <a:r>
+              <a:rPr lang="en-US" dirty="0" err="1" smtClean="0"/>
+              <a:t>qplot</a:t>
+            </a:r>
+            <a:r>
+              <a:rPr lang="en-US" dirty="0" smtClean="0"/>
+              <a:t>(satisfaction</a:t>
+            </a:r>
+            <a:r>
+              <a:rPr lang="en-US" dirty="0"/>
+              <a:t>, data = </a:t>
+            </a:r>
+            <a:r>
+              <a:rPr lang="en-US" dirty="0" err="1"/>
+              <a:t>acitelli</a:t>
+            </a:r>
+            <a:r>
+              <a:rPr lang="en-US" dirty="0"/>
+              <a:t>, bins = 10)</a:t>
+            </a:r>
+          </a:p>
+        </p:txBody>
+      </p:sp>
+      <p:pic>
+        <p:nvPicPr>
+          <p:cNvPr id="4" name="Picture 3"/>
+          <p:cNvPicPr>
+            <a:picLocks noChangeAspect="1"/>
+          </p:cNvPicPr>
+          <p:nvPr/>
+        </p:nvPicPr>
+        <p:blipFill>
+          <a:blip r:embed="rId2">
+            <a:extLst>
+              <a:ext uri="{28A0092B-C50C-407E-A947-70E740481C1C}">
+                <a14:useLocalDpi xmlns:a14="http://schemas.microsoft.com/office/drawing/2010/main" val="0"/>
+              </a:ext>
+            </a:extLst>
+          </a:blip>
+          <a:stretch>
+            <a:fillRect/>
+          </a:stretch>
+        </p:blipFill>
+        <p:spPr>
+          <a:xfrm>
+            <a:off x="6263640" y="2821578"/>
+            <a:ext cx="5444321" cy="3365862"/>
+          </a:xfrm>
+          <a:prstGeom prst="rect">
+            <a:avLst/>
+          </a:prstGeom>
+        </p:spPr>
+      </p:pic>
     </p:spTree>
     <p:extLst>
       <p:ext uri="{BB962C8B-B14F-4D97-AF65-F5344CB8AC3E}">
-        <p14:creationId xmlns:p14="http://schemas.microsoft.com/office/powerpoint/2010/main" val="2086588469"/>
+        <p14:creationId xmlns:p14="http://schemas.microsoft.com/office/powerpoint/2010/main" val="756782824"/>
+      </p:ext>
+    </p:extLst>
+  </p:cSld>
+  <p:clrMapOvr>
+    <a:masterClrMapping/>
+  </p:clrMapOvr>
+</p:sld>
+</file>
+
+<file path=ppt/slides/slide16.xml><?xml version="1.0" encoding="utf-8"?>
+<p:sld xmlns:a="http://schemas.openxmlformats.org/drawingml/2006/main" xmlns:r="http://schemas.openxmlformats.org/officeDocument/2006/relationships" xmlns:p="http://schemas.openxmlformats.org/presentationml/2006/main">
+  <p:cSld>
+    <p:spTree>
+      <p:nvGrpSpPr>
+        <p:cNvPr id="1" name=""/>
+        <p:cNvGrpSpPr/>
+        <p:nvPr/>
+      </p:nvGrpSpPr>
+      <p:grpSpPr>
+        <a:xfrm>
+          <a:off x="0" y="0"/>
+          <a:ext cx="0" cy="0"/>
+          <a:chOff x="0" y="0"/>
+          <a:chExt cx="0" cy="0"/>
+        </a:xfrm>
+      </p:grpSpPr>
+      <p:sp>
+        <p:nvSpPr>
+          <p:cNvPr id="2" name="Title 1"/>
+          <p:cNvSpPr>
+            <a:spLocks noGrp="1"/>
+          </p:cNvSpPr>
+          <p:nvPr>
+            <p:ph type="title"/>
+          </p:nvPr>
+        </p:nvSpPr>
+        <p:spPr/>
+        <p:txBody>
+          <a:bodyPr/>
+          <a:lstStyle/>
+          <a:p>
+            <a:r>
+              <a:rPr lang="en-US" dirty="0" smtClean="0"/>
+              <a:t>Making </a:t>
+            </a:r>
+            <a:r>
+              <a:rPr lang="en-US" smtClean="0"/>
+              <a:t>Figures with ggplot2</a:t>
+            </a:r>
+            <a:endParaRPr lang="en-US"/>
+          </a:p>
+        </p:txBody>
+      </p:sp>
+      <p:sp>
+        <p:nvSpPr>
+          <p:cNvPr id="3" name="Content Placeholder 2"/>
+          <p:cNvSpPr>
+            <a:spLocks noGrp="1"/>
+          </p:cNvSpPr>
+          <p:nvPr>
+            <p:ph idx="1"/>
+          </p:nvPr>
+        </p:nvSpPr>
+        <p:spPr/>
+        <p:txBody>
+          <a:bodyPr/>
+          <a:lstStyle/>
+          <a:p>
+            <a:pPr marL="45720" indent="0">
+              <a:buNone/>
+            </a:pPr>
+            <a:r>
+              <a:rPr lang="en-US" dirty="0" err="1"/>
+              <a:t>qplot</a:t>
+            </a:r>
+            <a:r>
+              <a:rPr lang="en-US" dirty="0"/>
+              <a:t>(x = tension, y = satisfaction, data = </a:t>
+            </a:r>
+            <a:r>
+              <a:rPr lang="en-US" dirty="0" err="1"/>
+              <a:t>acitelli</a:t>
+            </a:r>
+            <a:r>
+              <a:rPr lang="en-US" dirty="0"/>
+              <a:t>)</a:t>
+            </a:r>
+          </a:p>
+        </p:txBody>
+      </p:sp>
+      <p:pic>
+        <p:nvPicPr>
+          <p:cNvPr id="4" name="Picture 3"/>
+          <p:cNvPicPr>
+            <a:picLocks noChangeAspect="1"/>
+          </p:cNvPicPr>
+          <p:nvPr/>
+        </p:nvPicPr>
+        <p:blipFill>
+          <a:blip r:embed="rId2">
+            <a:extLst>
+              <a:ext uri="{28A0092B-C50C-407E-A947-70E740481C1C}">
+                <a14:useLocalDpi xmlns:a14="http://schemas.microsoft.com/office/drawing/2010/main" val="0"/>
+              </a:ext>
+            </a:extLst>
+          </a:blip>
+          <a:stretch>
+            <a:fillRect/>
+          </a:stretch>
+        </p:blipFill>
+        <p:spPr>
+          <a:xfrm>
+            <a:off x="3631474" y="2809956"/>
+            <a:ext cx="5286410" cy="3515190"/>
+          </a:xfrm>
+          <a:prstGeom prst="rect">
+            <a:avLst/>
+          </a:prstGeom>
+        </p:spPr>
+      </p:pic>
+    </p:spTree>
+    <p:extLst>
+      <p:ext uri="{BB962C8B-B14F-4D97-AF65-F5344CB8AC3E}">
+        <p14:creationId xmlns:p14="http://schemas.microsoft.com/office/powerpoint/2010/main" val="2098631049"/>
+      </p:ext>
+    </p:extLst>
+  </p:cSld>
+  <p:clrMapOvr>
+    <a:masterClrMapping/>
+  </p:clrMapOvr>
+</p:sld>
+</file>
+
+<file path=ppt/slides/slide17.xml><?xml version="1.0" encoding="utf-8"?>
+<p:sld xmlns:a="http://schemas.openxmlformats.org/drawingml/2006/main" xmlns:r="http://schemas.openxmlformats.org/officeDocument/2006/relationships" xmlns:p="http://schemas.openxmlformats.org/presentationml/2006/main">
+  <p:cSld>
+    <p:spTree>
+      <p:nvGrpSpPr>
+        <p:cNvPr id="1" name=""/>
+        <p:cNvGrpSpPr/>
+        <p:nvPr/>
+      </p:nvGrpSpPr>
+      <p:grpSpPr>
+        <a:xfrm>
+          <a:off x="0" y="0"/>
+          <a:ext cx="0" cy="0"/>
+          <a:chOff x="0" y="0"/>
+          <a:chExt cx="0" cy="0"/>
+        </a:xfrm>
+      </p:grpSpPr>
+      <p:sp>
+        <p:nvSpPr>
+          <p:cNvPr id="2" name="Title 1"/>
+          <p:cNvSpPr>
+            <a:spLocks noGrp="1"/>
+          </p:cNvSpPr>
+          <p:nvPr>
+            <p:ph type="title"/>
+          </p:nvPr>
+        </p:nvSpPr>
+        <p:spPr/>
+        <p:txBody>
+          <a:bodyPr/>
+          <a:lstStyle/>
+          <a:p>
+            <a:r>
+              <a:rPr lang="en-US" dirty="0" smtClean="0"/>
+              <a:t>Making </a:t>
+            </a:r>
+            <a:r>
+              <a:rPr lang="en-US" smtClean="0"/>
+              <a:t>Figures with ggplot2</a:t>
+            </a:r>
+            <a:endParaRPr lang="en-US"/>
+          </a:p>
+        </p:txBody>
+      </p:sp>
+      <p:sp>
+        <p:nvSpPr>
+          <p:cNvPr id="3" name="Content Placeholder 2"/>
+          <p:cNvSpPr>
+            <a:spLocks noGrp="1"/>
+          </p:cNvSpPr>
+          <p:nvPr>
+            <p:ph idx="1"/>
+          </p:nvPr>
+        </p:nvSpPr>
+        <p:spPr/>
+        <p:txBody>
+          <a:bodyPr/>
+          <a:lstStyle/>
+          <a:p>
+            <a:r>
+              <a:rPr lang="en-US" dirty="0" smtClean="0"/>
+              <a:t>The </a:t>
+            </a:r>
+            <a:r>
+              <a:rPr lang="en-US" dirty="0" err="1" smtClean="0"/>
+              <a:t>qplot</a:t>
+            </a:r>
+            <a:r>
+              <a:rPr lang="en-US" dirty="0" smtClean="0"/>
+              <a:t>() function is good for quick visualizations</a:t>
+            </a:r>
+          </a:p>
+          <a:p>
+            <a:pPr lvl="1"/>
+            <a:r>
+              <a:rPr lang="en-US" dirty="0" smtClean="0"/>
+              <a:t>Good for probably 80% of what you’d want to do while analyzing data</a:t>
+            </a:r>
+          </a:p>
+          <a:p>
+            <a:endParaRPr lang="en-US" dirty="0" smtClean="0"/>
+          </a:p>
+          <a:p>
+            <a:r>
+              <a:rPr lang="en-US" dirty="0" smtClean="0"/>
+              <a:t>But, you’ll use the </a:t>
+            </a:r>
+            <a:r>
+              <a:rPr lang="en-US" dirty="0" err="1" smtClean="0"/>
+              <a:t>ggplot</a:t>
+            </a:r>
+            <a:r>
+              <a:rPr lang="en-US" dirty="0" smtClean="0"/>
+              <a:t>() function for anything more involved, probably for making figures for publication</a:t>
+            </a:r>
+          </a:p>
+          <a:p>
+            <a:endParaRPr lang="en-US" dirty="0"/>
+          </a:p>
+          <a:p>
+            <a:r>
+              <a:rPr lang="en-US" dirty="0" smtClean="0"/>
+              <a:t>The ggplot2 packages uses the “grammar of graphics"</a:t>
+            </a:r>
+            <a:endParaRPr lang="en-US" dirty="0"/>
+          </a:p>
+        </p:txBody>
+      </p:sp>
+    </p:spTree>
+    <p:extLst>
+      <p:ext uri="{BB962C8B-B14F-4D97-AF65-F5344CB8AC3E}">
+        <p14:creationId xmlns:p14="http://schemas.microsoft.com/office/powerpoint/2010/main" val="1420622215"/>
+      </p:ext>
+    </p:extLst>
+  </p:cSld>
+  <p:clrMapOvr>
+    <a:masterClrMapping/>
+  </p:clrMapOvr>
+</p:sld>
+</file>
+
+<file path=ppt/slides/slide18.xml><?xml version="1.0" encoding="utf-8"?>
+<p:sld xmlns:a="http://schemas.openxmlformats.org/drawingml/2006/main" xmlns:r="http://schemas.openxmlformats.org/officeDocument/2006/relationships" xmlns:p="http://schemas.openxmlformats.org/presentationml/2006/main">
+  <p:cSld>
+    <p:spTree>
+      <p:nvGrpSpPr>
+        <p:cNvPr id="1" name=""/>
+        <p:cNvGrpSpPr/>
+        <p:nvPr/>
+      </p:nvGrpSpPr>
+      <p:grpSpPr>
+        <a:xfrm>
+          <a:off x="0" y="0"/>
+          <a:ext cx="0" cy="0"/>
+          <a:chOff x="0" y="0"/>
+          <a:chExt cx="0" cy="0"/>
+        </a:xfrm>
+      </p:grpSpPr>
+      <p:sp>
+        <p:nvSpPr>
+          <p:cNvPr id="2" name="Title 1"/>
+          <p:cNvSpPr>
+            <a:spLocks noGrp="1"/>
+          </p:cNvSpPr>
+          <p:nvPr>
+            <p:ph type="title"/>
+          </p:nvPr>
+        </p:nvSpPr>
+        <p:spPr/>
+        <p:txBody>
+          <a:bodyPr/>
+          <a:lstStyle/>
+          <a:p>
+            <a:r>
+              <a:rPr lang="en-US" dirty="0" smtClean="0"/>
+              <a:t>Making </a:t>
+            </a:r>
+            <a:r>
+              <a:rPr lang="en-US" smtClean="0"/>
+              <a:t>Figures with ggplot2</a:t>
+            </a:r>
+            <a:endParaRPr lang="en-US"/>
+          </a:p>
+        </p:txBody>
+      </p:sp>
+      <p:sp>
+        <p:nvSpPr>
+          <p:cNvPr id="3" name="Content Placeholder 2"/>
+          <p:cNvSpPr>
+            <a:spLocks noGrp="1"/>
+          </p:cNvSpPr>
+          <p:nvPr>
+            <p:ph idx="1"/>
+          </p:nvPr>
+        </p:nvSpPr>
+        <p:spPr/>
+        <p:txBody>
+          <a:bodyPr/>
+          <a:lstStyle/>
+          <a:p>
+            <a:r>
+              <a:rPr lang="en-US" dirty="0" smtClean="0"/>
+              <a:t>We independently specify pieces of the graph using the “grammar of graphics”</a:t>
+            </a:r>
+          </a:p>
+          <a:p>
+            <a:r>
+              <a:rPr lang="en-US" dirty="0" smtClean="0"/>
+              <a:t>Building blocks:</a:t>
+            </a:r>
+            <a:endParaRPr lang="en-US" dirty="0"/>
+          </a:p>
+          <a:p>
+            <a:pPr lvl="1"/>
+            <a:r>
+              <a:rPr lang="en-US" b="1" dirty="0" smtClean="0"/>
+              <a:t>Data</a:t>
+            </a:r>
+          </a:p>
+          <a:p>
+            <a:pPr lvl="1"/>
+            <a:r>
+              <a:rPr lang="en-US" b="1" dirty="0" smtClean="0"/>
+              <a:t>Geometric objects </a:t>
+            </a:r>
+            <a:r>
+              <a:rPr lang="en-US" dirty="0" smtClean="0"/>
+              <a:t>(the actual things we’ll draw</a:t>
+            </a:r>
+            <a:r>
+              <a:rPr lang="en-US" dirty="0"/>
+              <a:t>:</a:t>
+            </a:r>
+            <a:r>
+              <a:rPr lang="en-US" dirty="0" smtClean="0"/>
+              <a:t> points, lines, boxplot, histograms, etc.)</a:t>
+            </a:r>
+          </a:p>
+          <a:p>
+            <a:pPr lvl="1"/>
+            <a:r>
+              <a:rPr lang="en-US" b="1" dirty="0" smtClean="0"/>
+              <a:t>Aesthetic mappings </a:t>
+            </a:r>
+            <a:r>
+              <a:rPr lang="en-US" dirty="0" smtClean="0"/>
+              <a:t>(what and where we’ll draw: x-axis, y-axis, color, fill, shape, size, </a:t>
+            </a:r>
+            <a:r>
+              <a:rPr lang="en-US" dirty="0" err="1" smtClean="0"/>
+              <a:t>linetype</a:t>
+            </a:r>
+            <a:r>
+              <a:rPr lang="en-US" dirty="0" smtClean="0"/>
+              <a:t>, etc.)</a:t>
+            </a:r>
+          </a:p>
+          <a:p>
+            <a:pPr lvl="1"/>
+            <a:r>
+              <a:rPr lang="en-US" b="1" dirty="0" smtClean="0"/>
+              <a:t>Statistics </a:t>
+            </a:r>
+            <a:r>
+              <a:rPr lang="en-US" dirty="0" smtClean="0"/>
+              <a:t>(implied or specified computing to be done)</a:t>
+            </a:r>
+          </a:p>
+          <a:p>
+            <a:pPr lvl="1"/>
+            <a:r>
+              <a:rPr lang="en-US" b="1" dirty="0" smtClean="0"/>
+              <a:t>Scales</a:t>
+            </a:r>
+            <a:r>
+              <a:rPr lang="en-US" dirty="0" smtClean="0"/>
+              <a:t> (range of values, colors, or shapes)</a:t>
+            </a:r>
+          </a:p>
+          <a:p>
+            <a:pPr lvl="1"/>
+            <a:r>
+              <a:rPr lang="en-US" b="1" dirty="0" smtClean="0"/>
+              <a:t>Facets </a:t>
+            </a:r>
+            <a:r>
+              <a:rPr lang="en-US" dirty="0" smtClean="0"/>
+              <a:t>(the panes—there can be more than 1, layers in SPSS)</a:t>
+            </a:r>
+          </a:p>
+          <a:p>
+            <a:pPr lvl="1"/>
+            <a:r>
+              <a:rPr lang="en-US" b="1" dirty="0" smtClean="0"/>
+              <a:t>Guides</a:t>
+            </a:r>
+            <a:r>
+              <a:rPr lang="en-US" dirty="0" smtClean="0"/>
+              <a:t> (legends—what the humans see)</a:t>
+            </a:r>
+            <a:endParaRPr lang="en-US" dirty="0"/>
+          </a:p>
+        </p:txBody>
+      </p:sp>
+    </p:spTree>
+    <p:extLst>
+      <p:ext uri="{BB962C8B-B14F-4D97-AF65-F5344CB8AC3E}">
+        <p14:creationId xmlns:p14="http://schemas.microsoft.com/office/powerpoint/2010/main" val="501394229"/>
+      </p:ext>
+    </p:extLst>
+  </p:cSld>
+  <p:clrMapOvr>
+    <a:masterClrMapping/>
+  </p:clrMapOvr>
+</p:sld>
+</file>
+
+<file path=ppt/slides/slide19.xml><?xml version="1.0" encoding="utf-8"?>
+<p:sld xmlns:a="http://schemas.openxmlformats.org/drawingml/2006/main" xmlns:r="http://schemas.openxmlformats.org/officeDocument/2006/relationships" xmlns:p="http://schemas.openxmlformats.org/presentationml/2006/main">
+  <p:cSld>
+    <p:spTree>
+      <p:nvGrpSpPr>
+        <p:cNvPr id="1" name=""/>
+        <p:cNvGrpSpPr/>
+        <p:nvPr/>
+      </p:nvGrpSpPr>
+      <p:grpSpPr>
+        <a:xfrm>
+          <a:off x="0" y="0"/>
+          <a:ext cx="0" cy="0"/>
+          <a:chOff x="0" y="0"/>
+          <a:chExt cx="0" cy="0"/>
+        </a:xfrm>
+      </p:grpSpPr>
+      <p:sp>
+        <p:nvSpPr>
+          <p:cNvPr id="2" name="Title 1"/>
+          <p:cNvSpPr>
+            <a:spLocks noGrp="1"/>
+          </p:cNvSpPr>
+          <p:nvPr>
+            <p:ph type="title"/>
+          </p:nvPr>
+        </p:nvSpPr>
+        <p:spPr/>
+        <p:txBody>
+          <a:bodyPr/>
+          <a:lstStyle/>
+          <a:p>
+            <a:r>
+              <a:rPr lang="en-US" dirty="0" err="1"/>
+              <a:t>g</a:t>
+            </a:r>
+            <a:r>
+              <a:rPr lang="en-US" dirty="0" err="1" smtClean="0"/>
+              <a:t>gplot</a:t>
+            </a:r>
+            <a:r>
+              <a:rPr lang="en-US" dirty="0" smtClean="0"/>
+              <a:t>()</a:t>
+            </a:r>
+            <a:endParaRPr lang="en-US" dirty="0"/>
+          </a:p>
+        </p:txBody>
+      </p:sp>
+      <p:pic>
+        <p:nvPicPr>
+          <p:cNvPr id="3" name="Picture 2"/>
+          <p:cNvPicPr>
+            <a:picLocks noChangeAspect="1"/>
+          </p:cNvPicPr>
+          <p:nvPr/>
+        </p:nvPicPr>
+        <p:blipFill>
+          <a:blip r:embed="rId2">
+            <a:extLst>
+              <a:ext uri="{28A0092B-C50C-407E-A947-70E740481C1C}">
+                <a14:useLocalDpi xmlns:a14="http://schemas.microsoft.com/office/drawing/2010/main" val="0"/>
+              </a:ext>
+            </a:extLst>
+          </a:blip>
+          <a:stretch>
+            <a:fillRect/>
+          </a:stretch>
+        </p:blipFill>
+        <p:spPr>
+          <a:xfrm>
+            <a:off x="2482215" y="1965960"/>
+            <a:ext cx="7197090" cy="4459735"/>
+          </a:xfrm>
+          <a:prstGeom prst="rect">
+            <a:avLst/>
+          </a:prstGeom>
+        </p:spPr>
+      </p:pic>
+    </p:spTree>
+    <p:extLst>
+      <p:ext uri="{BB962C8B-B14F-4D97-AF65-F5344CB8AC3E}">
+        <p14:creationId xmlns:p14="http://schemas.microsoft.com/office/powerpoint/2010/main" val="292463322"/>
       </p:ext>
     </p:extLst>
   </p:cSld>
@@ -5161,6 +5827,1320 @@
       </p:par>
     </p:tnLst>
   </p:timing>
+</p:sld>
+</file>
+
+<file path=ppt/slides/slide20.xml><?xml version="1.0" encoding="utf-8"?>
+<p:sld xmlns:a="http://schemas.openxmlformats.org/drawingml/2006/main" xmlns:r="http://schemas.openxmlformats.org/officeDocument/2006/relationships" xmlns:p="http://schemas.openxmlformats.org/presentationml/2006/main">
+  <p:cSld>
+    <p:spTree>
+      <p:nvGrpSpPr>
+        <p:cNvPr id="1" name=""/>
+        <p:cNvGrpSpPr/>
+        <p:nvPr/>
+      </p:nvGrpSpPr>
+      <p:grpSpPr>
+        <a:xfrm>
+          <a:off x="0" y="0"/>
+          <a:ext cx="0" cy="0"/>
+          <a:chOff x="0" y="0"/>
+          <a:chExt cx="0" cy="0"/>
+        </a:xfrm>
+      </p:grpSpPr>
+      <p:sp>
+        <p:nvSpPr>
+          <p:cNvPr id="2" name="Title 1"/>
+          <p:cNvSpPr>
+            <a:spLocks noGrp="1"/>
+          </p:cNvSpPr>
+          <p:nvPr>
+            <p:ph type="title"/>
+          </p:nvPr>
+        </p:nvSpPr>
+        <p:spPr/>
+        <p:txBody>
+          <a:bodyPr/>
+          <a:lstStyle/>
+          <a:p>
+            <a:r>
+              <a:rPr lang="en-US" dirty="0" err="1"/>
+              <a:t>ggplot</a:t>
+            </a:r>
+            <a:r>
+              <a:rPr lang="en-US" dirty="0"/>
+              <a:t>(</a:t>
+            </a:r>
+            <a:r>
+              <a:rPr lang="en-US" dirty="0" err="1"/>
+              <a:t>acitelli</a:t>
+            </a:r>
+            <a:r>
+              <a:rPr lang="en-US" dirty="0"/>
+              <a:t>, </a:t>
+            </a:r>
+            <a:r>
+              <a:rPr lang="en-US" dirty="0" err="1"/>
+              <a:t>aes</a:t>
+            </a:r>
+            <a:r>
+              <a:rPr lang="en-US" dirty="0"/>
+              <a:t>(x = satisfaction))</a:t>
+            </a:r>
+          </a:p>
+        </p:txBody>
+      </p:sp>
+      <p:pic>
+        <p:nvPicPr>
+          <p:cNvPr id="4" name="Picture 3"/>
+          <p:cNvPicPr>
+            <a:picLocks noChangeAspect="1"/>
+          </p:cNvPicPr>
+          <p:nvPr/>
+        </p:nvPicPr>
+        <p:blipFill>
+          <a:blip r:embed="rId2">
+            <a:extLst>
+              <a:ext uri="{28A0092B-C50C-407E-A947-70E740481C1C}">
+                <a14:useLocalDpi xmlns:a14="http://schemas.microsoft.com/office/drawing/2010/main" val="0"/>
+              </a:ext>
+            </a:extLst>
+          </a:blip>
+          <a:stretch>
+            <a:fillRect/>
+          </a:stretch>
+        </p:blipFill>
+        <p:spPr>
+          <a:xfrm>
+            <a:off x="2391047" y="1965960"/>
+            <a:ext cx="7379426" cy="4551697"/>
+          </a:xfrm>
+          <a:prstGeom prst="rect">
+            <a:avLst/>
+          </a:prstGeom>
+        </p:spPr>
+      </p:pic>
+    </p:spTree>
+    <p:extLst>
+      <p:ext uri="{BB962C8B-B14F-4D97-AF65-F5344CB8AC3E}">
+        <p14:creationId xmlns:p14="http://schemas.microsoft.com/office/powerpoint/2010/main" val="136121277"/>
+      </p:ext>
+    </p:extLst>
+  </p:cSld>
+  <p:clrMapOvr>
+    <a:masterClrMapping/>
+  </p:clrMapOvr>
+</p:sld>
+</file>
+
+<file path=ppt/slides/slide21.xml><?xml version="1.0" encoding="utf-8"?>
+<p:sld xmlns:a="http://schemas.openxmlformats.org/drawingml/2006/main" xmlns:r="http://schemas.openxmlformats.org/officeDocument/2006/relationships" xmlns:p="http://schemas.openxmlformats.org/presentationml/2006/main">
+  <p:cSld>
+    <p:spTree>
+      <p:nvGrpSpPr>
+        <p:cNvPr id="1" name=""/>
+        <p:cNvGrpSpPr/>
+        <p:nvPr/>
+      </p:nvGrpSpPr>
+      <p:grpSpPr>
+        <a:xfrm>
+          <a:off x="0" y="0"/>
+          <a:ext cx="0" cy="0"/>
+          <a:chOff x="0" y="0"/>
+          <a:chExt cx="0" cy="0"/>
+        </a:xfrm>
+      </p:grpSpPr>
+      <p:sp>
+        <p:nvSpPr>
+          <p:cNvPr id="2" name="Title 1"/>
+          <p:cNvSpPr>
+            <a:spLocks noGrp="1"/>
+          </p:cNvSpPr>
+          <p:nvPr>
+            <p:ph type="title"/>
+          </p:nvPr>
+        </p:nvSpPr>
+        <p:spPr/>
+        <p:txBody>
+          <a:bodyPr/>
+          <a:lstStyle/>
+          <a:p>
+            <a:pPr marL="582613" indent="-582613"/>
+            <a:r>
+              <a:rPr lang="en-US" dirty="0" err="1"/>
+              <a:t>ggplot</a:t>
+            </a:r>
+            <a:r>
+              <a:rPr lang="en-US" dirty="0"/>
+              <a:t>(</a:t>
+            </a:r>
+            <a:r>
+              <a:rPr lang="en-US" dirty="0" err="1"/>
+              <a:t>acitelli</a:t>
+            </a:r>
+            <a:r>
+              <a:rPr lang="en-US" dirty="0"/>
+              <a:t>, </a:t>
+            </a:r>
+            <a:r>
+              <a:rPr lang="en-US" dirty="0" err="1"/>
+              <a:t>aes</a:t>
+            </a:r>
+            <a:r>
+              <a:rPr lang="en-US" dirty="0"/>
+              <a:t>(x = satisfaction)) </a:t>
+            </a:r>
+            <a:r>
+              <a:rPr lang="en-US" b="1" dirty="0"/>
+              <a:t>+  </a:t>
+            </a:r>
+            <a:r>
+              <a:rPr lang="en-US" b="1" dirty="0" err="1"/>
+              <a:t>geom_histogram</a:t>
+            </a:r>
+            <a:r>
+              <a:rPr lang="en-US" b="1" dirty="0"/>
+              <a:t>()</a:t>
+            </a:r>
+          </a:p>
+        </p:txBody>
+      </p:sp>
+      <p:pic>
+        <p:nvPicPr>
+          <p:cNvPr id="4" name="Picture 3"/>
+          <p:cNvPicPr>
+            <a:picLocks noChangeAspect="1"/>
+          </p:cNvPicPr>
+          <p:nvPr/>
+        </p:nvPicPr>
+        <p:blipFill>
+          <a:blip r:embed="rId2">
+            <a:extLst>
+              <a:ext uri="{28A0092B-C50C-407E-A947-70E740481C1C}">
+                <a14:useLocalDpi xmlns:a14="http://schemas.microsoft.com/office/drawing/2010/main" val="0"/>
+              </a:ext>
+            </a:extLst>
+          </a:blip>
+          <a:stretch>
+            <a:fillRect/>
+          </a:stretch>
+        </p:blipFill>
+        <p:spPr>
+          <a:xfrm>
+            <a:off x="2534013" y="2137897"/>
+            <a:ext cx="7093494" cy="4374662"/>
+          </a:xfrm>
+          <a:prstGeom prst="rect">
+            <a:avLst/>
+          </a:prstGeom>
+        </p:spPr>
+      </p:pic>
+      <p:sp>
+        <p:nvSpPr>
+          <p:cNvPr id="5" name="TextBox 4"/>
+          <p:cNvSpPr txBox="1"/>
+          <p:nvPr/>
+        </p:nvSpPr>
+        <p:spPr>
+          <a:xfrm>
+            <a:off x="783772" y="3278777"/>
+            <a:ext cx="1015021" cy="369332"/>
+          </a:xfrm>
+          <a:prstGeom prst="rect">
+            <a:avLst/>
+          </a:prstGeom>
+          <a:noFill/>
+        </p:spPr>
+        <p:txBody>
+          <a:bodyPr wrap="none" rtlCol="0">
+            <a:spAutoFit/>
+          </a:bodyPr>
+          <a:lstStyle/>
+          <a:p>
+            <a:r>
+              <a:rPr lang="en-US" b="1" smtClean="0">
+                <a:solidFill>
+                  <a:srgbClr val="7030A0"/>
+                </a:solidFill>
+              </a:rPr>
+              <a:t>Statistic</a:t>
+            </a:r>
+            <a:endParaRPr lang="en-US" b="1">
+              <a:solidFill>
+                <a:srgbClr val="7030A0"/>
+              </a:solidFill>
+            </a:endParaRPr>
+          </a:p>
+        </p:txBody>
+      </p:sp>
+      <p:sp>
+        <p:nvSpPr>
+          <p:cNvPr id="6" name="TextBox 5"/>
+          <p:cNvSpPr txBox="1"/>
+          <p:nvPr/>
+        </p:nvSpPr>
+        <p:spPr>
+          <a:xfrm>
+            <a:off x="9853276" y="4840376"/>
+            <a:ext cx="1903085" cy="369332"/>
+          </a:xfrm>
+          <a:prstGeom prst="rect">
+            <a:avLst/>
+          </a:prstGeom>
+          <a:noFill/>
+        </p:spPr>
+        <p:txBody>
+          <a:bodyPr wrap="none" rtlCol="0">
+            <a:spAutoFit/>
+          </a:bodyPr>
+          <a:lstStyle/>
+          <a:p>
+            <a:r>
+              <a:rPr lang="en-US" b="1" smtClean="0">
+                <a:solidFill>
+                  <a:srgbClr val="7030A0"/>
+                </a:solidFill>
+              </a:rPr>
+              <a:t>Geometric object</a:t>
+            </a:r>
+            <a:endParaRPr lang="en-US" b="1" dirty="0">
+              <a:solidFill>
+                <a:srgbClr val="7030A0"/>
+              </a:solidFill>
+            </a:endParaRPr>
+          </a:p>
+        </p:txBody>
+      </p:sp>
+      <p:cxnSp>
+        <p:nvCxnSpPr>
+          <p:cNvPr id="8" name="Straight Arrow Connector 7"/>
+          <p:cNvCxnSpPr>
+            <a:stCxn id="5" idx="3"/>
+          </p:cNvCxnSpPr>
+          <p:nvPr/>
+        </p:nvCxnSpPr>
+        <p:spPr>
+          <a:xfrm>
+            <a:off x="1798793" y="3463443"/>
+            <a:ext cx="839904" cy="184666"/>
+          </a:xfrm>
+          <a:prstGeom prst="straightConnector1">
+            <a:avLst/>
+          </a:prstGeom>
+          <a:ln>
+            <a:solidFill>
+              <a:srgbClr val="7030A0"/>
+            </a:solidFill>
+            <a:tailEnd type="triangle"/>
+          </a:ln>
+        </p:spPr>
+        <p:style>
+          <a:lnRef idx="1">
+            <a:schemeClr val="accent1"/>
+          </a:lnRef>
+          <a:fillRef idx="0">
+            <a:schemeClr val="accent1"/>
+          </a:fillRef>
+          <a:effectRef idx="0">
+            <a:schemeClr val="accent1"/>
+          </a:effectRef>
+          <a:fontRef idx="minor">
+            <a:schemeClr val="tx1"/>
+          </a:fontRef>
+        </p:style>
+      </p:cxnSp>
+      <p:cxnSp>
+        <p:nvCxnSpPr>
+          <p:cNvPr id="11" name="Straight Arrow Connector 10"/>
+          <p:cNvCxnSpPr>
+            <a:stCxn id="6" idx="1"/>
+          </p:cNvCxnSpPr>
+          <p:nvPr/>
+        </p:nvCxnSpPr>
+        <p:spPr>
+          <a:xfrm flipH="1" flipV="1">
+            <a:off x="8908868" y="5016138"/>
+            <a:ext cx="944408" cy="8904"/>
+          </a:xfrm>
+          <a:prstGeom prst="straightConnector1">
+            <a:avLst/>
+          </a:prstGeom>
+          <a:ln>
+            <a:solidFill>
+              <a:srgbClr val="7030A0"/>
+            </a:solidFill>
+            <a:tailEnd type="triangle"/>
+          </a:ln>
+        </p:spPr>
+        <p:style>
+          <a:lnRef idx="1">
+            <a:schemeClr val="accent1"/>
+          </a:lnRef>
+          <a:fillRef idx="0">
+            <a:schemeClr val="accent1"/>
+          </a:fillRef>
+          <a:effectRef idx="0">
+            <a:schemeClr val="accent1"/>
+          </a:effectRef>
+          <a:fontRef idx="minor">
+            <a:schemeClr val="tx1"/>
+          </a:fontRef>
+        </p:style>
+      </p:cxnSp>
+    </p:spTree>
+    <p:extLst>
+      <p:ext uri="{BB962C8B-B14F-4D97-AF65-F5344CB8AC3E}">
+        <p14:creationId xmlns:p14="http://schemas.microsoft.com/office/powerpoint/2010/main" val="1327948187"/>
+      </p:ext>
+    </p:extLst>
+  </p:cSld>
+  <p:clrMapOvr>
+    <a:masterClrMapping/>
+  </p:clrMapOvr>
+</p:sld>
+</file>
+
+<file path=ppt/slides/slide22.xml><?xml version="1.0" encoding="utf-8"?>
+<p:sld xmlns:a="http://schemas.openxmlformats.org/drawingml/2006/main" xmlns:r="http://schemas.openxmlformats.org/officeDocument/2006/relationships" xmlns:p="http://schemas.openxmlformats.org/presentationml/2006/main">
+  <p:cSld>
+    <p:spTree>
+      <p:nvGrpSpPr>
+        <p:cNvPr id="1" name=""/>
+        <p:cNvGrpSpPr/>
+        <p:nvPr/>
+      </p:nvGrpSpPr>
+      <p:grpSpPr>
+        <a:xfrm>
+          <a:off x="0" y="0"/>
+          <a:ext cx="0" cy="0"/>
+          <a:chOff x="0" y="0"/>
+          <a:chExt cx="0" cy="0"/>
+        </a:xfrm>
+      </p:grpSpPr>
+      <p:sp>
+        <p:nvSpPr>
+          <p:cNvPr id="2" name="Title 1"/>
+          <p:cNvSpPr>
+            <a:spLocks noGrp="1"/>
+          </p:cNvSpPr>
+          <p:nvPr>
+            <p:ph type="title"/>
+          </p:nvPr>
+        </p:nvSpPr>
+        <p:spPr/>
+        <p:txBody>
+          <a:bodyPr anchor="t">
+            <a:normAutofit/>
+          </a:bodyPr>
+          <a:lstStyle/>
+          <a:p>
+            <a:r>
+              <a:rPr lang="en-US" sz="3600" dirty="0" err="1"/>
+              <a:t>ggplot</a:t>
+            </a:r>
+            <a:r>
+              <a:rPr lang="en-US" sz="3600" dirty="0"/>
+              <a:t>(</a:t>
+            </a:r>
+            <a:r>
+              <a:rPr lang="en-US" sz="3600" dirty="0" err="1"/>
+              <a:t>acitelli</a:t>
+            </a:r>
+            <a:r>
+              <a:rPr lang="en-US" sz="3600" dirty="0"/>
+              <a:t>, </a:t>
+            </a:r>
+            <a:r>
+              <a:rPr lang="en-US" sz="3600" dirty="0" err="1" smtClean="0"/>
+              <a:t>aes</a:t>
+            </a:r>
+            <a:r>
+              <a:rPr lang="en-US" sz="3600" dirty="0" smtClean="0"/>
+              <a:t>(x = tension, y </a:t>
+            </a:r>
+            <a:r>
+              <a:rPr lang="en-US" sz="3600" dirty="0"/>
+              <a:t>= satisfaction))</a:t>
+            </a:r>
+          </a:p>
+        </p:txBody>
+      </p:sp>
+      <p:pic>
+        <p:nvPicPr>
+          <p:cNvPr id="3" name="Picture 2"/>
+          <p:cNvPicPr>
+            <a:picLocks noChangeAspect="1"/>
+          </p:cNvPicPr>
+          <p:nvPr/>
+        </p:nvPicPr>
+        <p:blipFill>
+          <a:blip r:embed="rId2">
+            <a:extLst>
+              <a:ext uri="{28A0092B-C50C-407E-A947-70E740481C1C}">
+                <a14:useLocalDpi xmlns:a14="http://schemas.microsoft.com/office/drawing/2010/main" val="0"/>
+              </a:ext>
+            </a:extLst>
+          </a:blip>
+          <a:stretch>
+            <a:fillRect/>
+          </a:stretch>
+        </p:blipFill>
+        <p:spPr>
+          <a:xfrm>
+            <a:off x="2517956" y="2104570"/>
+            <a:ext cx="7125607" cy="4420327"/>
+          </a:xfrm>
+          <a:prstGeom prst="rect">
+            <a:avLst/>
+          </a:prstGeom>
+        </p:spPr>
+      </p:pic>
+    </p:spTree>
+    <p:extLst>
+      <p:ext uri="{BB962C8B-B14F-4D97-AF65-F5344CB8AC3E}">
+        <p14:creationId xmlns:p14="http://schemas.microsoft.com/office/powerpoint/2010/main" val="792759820"/>
+      </p:ext>
+    </p:extLst>
+  </p:cSld>
+  <p:clrMapOvr>
+    <a:masterClrMapping/>
+  </p:clrMapOvr>
+</p:sld>
+</file>
+
+<file path=ppt/slides/slide23.xml><?xml version="1.0" encoding="utf-8"?>
+<p:sld xmlns:a="http://schemas.openxmlformats.org/drawingml/2006/main" xmlns:r="http://schemas.openxmlformats.org/officeDocument/2006/relationships" xmlns:p="http://schemas.openxmlformats.org/presentationml/2006/main">
+  <p:cSld>
+    <p:spTree>
+      <p:nvGrpSpPr>
+        <p:cNvPr id="1" name=""/>
+        <p:cNvGrpSpPr/>
+        <p:nvPr/>
+      </p:nvGrpSpPr>
+      <p:grpSpPr>
+        <a:xfrm>
+          <a:off x="0" y="0"/>
+          <a:ext cx="0" cy="0"/>
+          <a:chOff x="0" y="0"/>
+          <a:chExt cx="0" cy="0"/>
+        </a:xfrm>
+      </p:grpSpPr>
+      <p:sp>
+        <p:nvSpPr>
+          <p:cNvPr id="2" name="Title 1"/>
+          <p:cNvSpPr>
+            <a:spLocks noGrp="1"/>
+          </p:cNvSpPr>
+          <p:nvPr>
+            <p:ph type="title"/>
+          </p:nvPr>
+        </p:nvSpPr>
+        <p:spPr/>
+        <p:txBody>
+          <a:bodyPr>
+            <a:normAutofit/>
+          </a:bodyPr>
+          <a:lstStyle/>
+          <a:p>
+            <a:pPr marL="465138" indent="-465138"/>
+            <a:r>
+              <a:rPr lang="en-US" sz="3600" dirty="0" err="1"/>
+              <a:t>ggplot</a:t>
+            </a:r>
+            <a:r>
+              <a:rPr lang="en-US" sz="3600" dirty="0"/>
+              <a:t>(</a:t>
+            </a:r>
+            <a:r>
+              <a:rPr lang="en-US" sz="3600" dirty="0" err="1"/>
+              <a:t>acitelli</a:t>
+            </a:r>
+            <a:r>
+              <a:rPr lang="en-US" sz="3600" dirty="0"/>
+              <a:t>, </a:t>
+            </a:r>
+            <a:r>
+              <a:rPr lang="en-US" sz="3600" dirty="0" err="1"/>
+              <a:t>aes</a:t>
+            </a:r>
+            <a:r>
+              <a:rPr lang="en-US" sz="3600" dirty="0"/>
+              <a:t>(x = tension, y = satisfaction)) </a:t>
+            </a:r>
+            <a:r>
+              <a:rPr lang="en-US" sz="3600" b="1" dirty="0"/>
+              <a:t>+  </a:t>
+            </a:r>
+            <a:r>
+              <a:rPr lang="en-US" sz="3600" b="1" dirty="0" err="1"/>
+              <a:t>geom_point</a:t>
+            </a:r>
+            <a:r>
+              <a:rPr lang="en-US" sz="3600" b="1" dirty="0"/>
+              <a:t>()</a:t>
+            </a:r>
+          </a:p>
+        </p:txBody>
+      </p:sp>
+      <p:pic>
+        <p:nvPicPr>
+          <p:cNvPr id="4" name="Picture 3"/>
+          <p:cNvPicPr>
+            <a:picLocks noChangeAspect="1"/>
+          </p:cNvPicPr>
+          <p:nvPr/>
+        </p:nvPicPr>
+        <p:blipFill>
+          <a:blip r:embed="rId2">
+            <a:extLst>
+              <a:ext uri="{28A0092B-C50C-407E-A947-70E740481C1C}">
+                <a14:useLocalDpi xmlns:a14="http://schemas.microsoft.com/office/drawing/2010/main" val="0"/>
+              </a:ext>
+            </a:extLst>
+          </a:blip>
+          <a:stretch>
+            <a:fillRect/>
+          </a:stretch>
+        </p:blipFill>
+        <p:spPr>
+          <a:xfrm>
+            <a:off x="2422029" y="1965960"/>
+            <a:ext cx="7317462" cy="4558937"/>
+          </a:xfrm>
+          <a:prstGeom prst="rect">
+            <a:avLst/>
+          </a:prstGeom>
+        </p:spPr>
+      </p:pic>
+    </p:spTree>
+    <p:extLst>
+      <p:ext uri="{BB962C8B-B14F-4D97-AF65-F5344CB8AC3E}">
+        <p14:creationId xmlns:p14="http://schemas.microsoft.com/office/powerpoint/2010/main" val="552547095"/>
+      </p:ext>
+    </p:extLst>
+  </p:cSld>
+  <p:clrMapOvr>
+    <a:masterClrMapping/>
+  </p:clrMapOvr>
+</p:sld>
+</file>
+
+<file path=ppt/slides/slide24.xml><?xml version="1.0" encoding="utf-8"?>
+<p:sld xmlns:a="http://schemas.openxmlformats.org/drawingml/2006/main" xmlns:r="http://schemas.openxmlformats.org/officeDocument/2006/relationships" xmlns:p="http://schemas.openxmlformats.org/presentationml/2006/main">
+  <p:cSld>
+    <p:spTree>
+      <p:nvGrpSpPr>
+        <p:cNvPr id="1" name=""/>
+        <p:cNvGrpSpPr/>
+        <p:nvPr/>
+      </p:nvGrpSpPr>
+      <p:grpSpPr>
+        <a:xfrm>
+          <a:off x="0" y="0"/>
+          <a:ext cx="0" cy="0"/>
+          <a:chOff x="0" y="0"/>
+          <a:chExt cx="0" cy="0"/>
+        </a:xfrm>
+      </p:grpSpPr>
+      <p:sp>
+        <p:nvSpPr>
+          <p:cNvPr id="4" name="Title 3"/>
+          <p:cNvSpPr>
+            <a:spLocks noGrp="1"/>
+          </p:cNvSpPr>
+          <p:nvPr>
+            <p:ph type="title"/>
+          </p:nvPr>
+        </p:nvSpPr>
+        <p:spPr/>
+        <p:txBody>
+          <a:bodyPr/>
+          <a:lstStyle/>
+          <a:p>
+            <a:r>
+              <a:rPr lang="en-US" dirty="0" smtClean="0"/>
+              <a:t>R Markdown File</a:t>
+            </a:r>
+            <a:endParaRPr lang="en-US" dirty="0"/>
+          </a:p>
+        </p:txBody>
+      </p:sp>
+      <p:sp>
+        <p:nvSpPr>
+          <p:cNvPr id="5" name="Text Placeholder 4"/>
+          <p:cNvSpPr>
+            <a:spLocks noGrp="1"/>
+          </p:cNvSpPr>
+          <p:nvPr>
+            <p:ph type="body" idx="1"/>
+          </p:nvPr>
+        </p:nvSpPr>
+        <p:spPr/>
+        <p:txBody>
+          <a:bodyPr/>
+          <a:lstStyle/>
+          <a:p>
+            <a:endParaRPr lang="en-US"/>
+          </a:p>
+        </p:txBody>
+      </p:sp>
+    </p:spTree>
+    <p:extLst>
+      <p:ext uri="{BB962C8B-B14F-4D97-AF65-F5344CB8AC3E}">
+        <p14:creationId xmlns:p14="http://schemas.microsoft.com/office/powerpoint/2010/main" val="1966228960"/>
+      </p:ext>
+    </p:extLst>
+  </p:cSld>
+  <p:clrMapOvr>
+    <a:masterClrMapping/>
+  </p:clrMapOvr>
+</p:sld>
+</file>
+
+<file path=ppt/slides/slide25.xml><?xml version="1.0" encoding="utf-8"?>
+<p:sld xmlns:a="http://schemas.openxmlformats.org/drawingml/2006/main" xmlns:r="http://schemas.openxmlformats.org/officeDocument/2006/relationships" xmlns:p="http://schemas.openxmlformats.org/presentationml/2006/main">
+  <p:cSld>
+    <p:spTree>
+      <p:nvGrpSpPr>
+        <p:cNvPr id="1" name=""/>
+        <p:cNvGrpSpPr/>
+        <p:nvPr/>
+      </p:nvGrpSpPr>
+      <p:grpSpPr>
+        <a:xfrm>
+          <a:off x="0" y="0"/>
+          <a:ext cx="0" cy="0"/>
+          <a:chOff x="0" y="0"/>
+          <a:chExt cx="0" cy="0"/>
+        </a:xfrm>
+      </p:grpSpPr>
+      <p:sp>
+        <p:nvSpPr>
+          <p:cNvPr id="2" name="Title 1"/>
+          <p:cNvSpPr>
+            <a:spLocks noGrp="1"/>
+          </p:cNvSpPr>
+          <p:nvPr>
+            <p:ph type="title"/>
+          </p:nvPr>
+        </p:nvSpPr>
+        <p:spPr/>
+        <p:txBody>
+          <a:bodyPr/>
+          <a:lstStyle/>
+          <a:p>
+            <a:r>
+              <a:rPr lang="en-US" dirty="0" smtClean="0"/>
+              <a:t>Correlation Matrices, Reliability, and </a:t>
+            </a:r>
+            <a:br>
+              <a:rPr lang="en-US" dirty="0" smtClean="0"/>
+            </a:br>
+            <a:r>
+              <a:rPr lang="en-US" dirty="0" smtClean="0"/>
+              <a:t>t-Tests</a:t>
+            </a:r>
+            <a:endParaRPr lang="en-US" dirty="0"/>
+          </a:p>
+        </p:txBody>
+      </p:sp>
+      <p:sp>
+        <p:nvSpPr>
+          <p:cNvPr id="3" name="Content Placeholder 2"/>
+          <p:cNvSpPr>
+            <a:spLocks noGrp="1"/>
+          </p:cNvSpPr>
+          <p:nvPr>
+            <p:ph idx="1"/>
+          </p:nvPr>
+        </p:nvSpPr>
+        <p:spPr/>
+        <p:txBody>
+          <a:bodyPr/>
+          <a:lstStyle/>
+          <a:p>
+            <a:r>
+              <a:rPr lang="en-US" dirty="0" smtClean="0"/>
+              <a:t>For correlation matrices and Cronbach’s alpha we’ll use the package </a:t>
+            </a:r>
+            <a:r>
+              <a:rPr lang="en-US" dirty="0" smtClean="0"/>
+              <a:t>called </a:t>
+            </a:r>
+            <a:r>
+              <a:rPr lang="en-US" b="1" dirty="0" smtClean="0"/>
+              <a:t>psych</a:t>
+            </a:r>
+            <a:endParaRPr lang="en-US" dirty="0" smtClean="0"/>
+          </a:p>
+          <a:p>
+            <a:r>
+              <a:rPr lang="en-US" dirty="0" smtClean="0"/>
+              <a:t>For t-Tests I recommend you use </a:t>
+            </a:r>
+            <a:r>
+              <a:rPr lang="en-US" b="1" dirty="0" smtClean="0"/>
+              <a:t>mosaic</a:t>
+            </a:r>
+            <a:r>
+              <a:rPr lang="en-US" dirty="0" smtClean="0"/>
+              <a:t> because it has that (now familiar) formula, then data, syntax</a:t>
+            </a:r>
+            <a:endParaRPr lang="en-US" dirty="0" smtClean="0"/>
+          </a:p>
+        </p:txBody>
+      </p:sp>
+    </p:spTree>
+    <p:extLst>
+      <p:ext uri="{BB962C8B-B14F-4D97-AF65-F5344CB8AC3E}">
+        <p14:creationId xmlns:p14="http://schemas.microsoft.com/office/powerpoint/2010/main" val="2086588469"/>
+      </p:ext>
+    </p:extLst>
+  </p:cSld>
+  <p:clrMapOvr>
+    <a:masterClrMapping/>
+  </p:clrMapOvr>
+</p:sld>
+</file>
+
+<file path=ppt/slides/slide26.xml><?xml version="1.0" encoding="utf-8"?>
+<p:sld xmlns:a="http://schemas.openxmlformats.org/drawingml/2006/main" xmlns:r="http://schemas.openxmlformats.org/officeDocument/2006/relationships" xmlns:p="http://schemas.openxmlformats.org/presentationml/2006/main">
+  <p:cSld>
+    <p:spTree>
+      <p:nvGrpSpPr>
+        <p:cNvPr id="1" name=""/>
+        <p:cNvGrpSpPr/>
+        <p:nvPr/>
+      </p:nvGrpSpPr>
+      <p:grpSpPr>
+        <a:xfrm>
+          <a:off x="0" y="0"/>
+          <a:ext cx="0" cy="0"/>
+          <a:chOff x="0" y="0"/>
+          <a:chExt cx="0" cy="0"/>
+        </a:xfrm>
+      </p:grpSpPr>
+      <p:sp>
+        <p:nvSpPr>
+          <p:cNvPr id="2" name="Title 1"/>
+          <p:cNvSpPr>
+            <a:spLocks noGrp="1"/>
+          </p:cNvSpPr>
+          <p:nvPr>
+            <p:ph type="title"/>
+          </p:nvPr>
+        </p:nvSpPr>
+        <p:spPr/>
+        <p:txBody>
+          <a:bodyPr/>
+          <a:lstStyle/>
+          <a:p>
+            <a:r>
+              <a:rPr lang="en-US" dirty="0" smtClean="0"/>
+              <a:t>Correlation Matrices, Reliability, and </a:t>
+            </a:r>
+            <a:br>
+              <a:rPr lang="en-US" dirty="0" smtClean="0"/>
+            </a:br>
+            <a:r>
+              <a:rPr lang="en-US" dirty="0" smtClean="0"/>
+              <a:t>t-Tests</a:t>
+            </a:r>
+            <a:endParaRPr lang="en-US" dirty="0"/>
+          </a:p>
+        </p:txBody>
+      </p:sp>
+      <p:sp>
+        <p:nvSpPr>
+          <p:cNvPr id="3" name="Content Placeholder 2"/>
+          <p:cNvSpPr>
+            <a:spLocks noGrp="1"/>
+          </p:cNvSpPr>
+          <p:nvPr>
+            <p:ph idx="1"/>
+          </p:nvPr>
+        </p:nvSpPr>
+        <p:spPr/>
+        <p:txBody>
+          <a:bodyPr/>
+          <a:lstStyle/>
+          <a:p>
+            <a:r>
+              <a:rPr lang="en-US" dirty="0" smtClean="0"/>
+              <a:t>Correlation Matrix</a:t>
+            </a:r>
+          </a:p>
+          <a:p>
+            <a:pPr lvl="1"/>
+            <a:r>
+              <a:rPr lang="en-US" dirty="0" err="1"/>
+              <a:t>corr.test</a:t>
+            </a:r>
+            <a:r>
+              <a:rPr lang="en-US" dirty="0"/>
+              <a:t>()</a:t>
+            </a:r>
+          </a:p>
+          <a:p>
+            <a:pPr lvl="1"/>
+            <a:r>
+              <a:rPr lang="en-US" dirty="0"/>
+              <a:t>I like to use this with select():</a:t>
+            </a:r>
+          </a:p>
+          <a:p>
+            <a:pPr marL="274320" lvl="1" indent="0" algn="ctr">
+              <a:buNone/>
+            </a:pPr>
+            <a:r>
+              <a:rPr lang="en-US" b="1" dirty="0" err="1"/>
+              <a:t>corr.test</a:t>
+            </a:r>
+            <a:r>
+              <a:rPr lang="en-US" b="1" dirty="0"/>
+              <a:t>(select(</a:t>
+            </a:r>
+            <a:r>
+              <a:rPr lang="en-US" b="1" dirty="0" err="1"/>
+              <a:t>acitelli</a:t>
+            </a:r>
+            <a:r>
+              <a:rPr lang="en-US" b="1" dirty="0"/>
+              <a:t>, tension, </a:t>
+            </a:r>
+            <a:r>
+              <a:rPr lang="en-US" b="1" dirty="0" err="1"/>
+              <a:t>self_pos</a:t>
+            </a:r>
+            <a:r>
+              <a:rPr lang="en-US" b="1" dirty="0"/>
+              <a:t>, </a:t>
+            </a:r>
+            <a:r>
+              <a:rPr lang="en-US" b="1" dirty="0" err="1" smtClean="0"/>
+              <a:t>other_pos</a:t>
+            </a:r>
+            <a:r>
+              <a:rPr lang="en-US" b="1" dirty="0"/>
+              <a:t>, satisfaction</a:t>
+            </a:r>
+            <a:r>
+              <a:rPr lang="en-US" b="1" dirty="0" smtClean="0"/>
+              <a:t>))</a:t>
+            </a:r>
+          </a:p>
+          <a:p>
+            <a:pPr marL="274320" lvl="1" indent="0" algn="ctr">
+              <a:buNone/>
+            </a:pPr>
+            <a:endParaRPr lang="en-US" b="1" dirty="0"/>
+          </a:p>
+          <a:p>
+            <a:r>
+              <a:rPr lang="en-US" dirty="0" smtClean="0"/>
+              <a:t>Reliability</a:t>
+            </a:r>
+          </a:p>
+          <a:p>
+            <a:pPr lvl="1"/>
+            <a:r>
+              <a:rPr lang="en-US" dirty="0"/>
+              <a:t>a</a:t>
+            </a:r>
+            <a:r>
+              <a:rPr lang="en-US" dirty="0" smtClean="0"/>
+              <a:t>lpha()</a:t>
+            </a:r>
+          </a:p>
+          <a:p>
+            <a:pPr lvl="1"/>
+            <a:r>
+              <a:rPr lang="en-US" dirty="0" smtClean="0"/>
+              <a:t>Also handy with select:</a:t>
+            </a:r>
+          </a:p>
+          <a:p>
+            <a:pPr marL="274320" lvl="1" indent="0" algn="ctr">
+              <a:buNone/>
+            </a:pPr>
+            <a:r>
+              <a:rPr lang="en-US" b="1" dirty="0" smtClean="0"/>
+              <a:t>alpha(select(</a:t>
+            </a:r>
+            <a:r>
+              <a:rPr lang="en-US" b="1" dirty="0" err="1" smtClean="0"/>
+              <a:t>acitelli</a:t>
+            </a:r>
+            <a:r>
+              <a:rPr lang="en-US" b="1" dirty="0"/>
+              <a:t>, </a:t>
+            </a:r>
+            <a:r>
+              <a:rPr lang="en-US" b="1" dirty="0" smtClean="0"/>
+              <a:t>sat1, sat2, sat3, sat4, sat5, sat6))</a:t>
+            </a:r>
+            <a:endParaRPr lang="en-US" b="1" dirty="0"/>
+          </a:p>
+        </p:txBody>
+      </p:sp>
+      <p:sp>
+        <p:nvSpPr>
+          <p:cNvPr id="4" name="Right Brace 3"/>
+          <p:cNvSpPr/>
+          <p:nvPr/>
+        </p:nvSpPr>
+        <p:spPr>
+          <a:xfrm rot="5400000">
+            <a:off x="7204165" y="1417321"/>
+            <a:ext cx="418014" cy="4506689"/>
+          </a:xfrm>
+          <a:prstGeom prst="rightBrace">
+            <a:avLst/>
+          </a:prstGeom>
+          <a:ln>
+            <a:solidFill>
+              <a:srgbClr val="7030A0"/>
+            </a:solidFill>
+          </a:ln>
+        </p:spPr>
+        <p:style>
+          <a:lnRef idx="1">
+            <a:schemeClr val="accent1"/>
+          </a:lnRef>
+          <a:fillRef idx="0">
+            <a:schemeClr val="accent1"/>
+          </a:fillRef>
+          <a:effectRef idx="0">
+            <a:schemeClr val="accent1"/>
+          </a:effectRef>
+          <a:fontRef idx="minor">
+            <a:schemeClr val="tx1"/>
+          </a:fontRef>
+        </p:style>
+        <p:txBody>
+          <a:bodyPr rtlCol="0" anchor="ctr"/>
+          <a:lstStyle/>
+          <a:p>
+            <a:pPr algn="ctr"/>
+            <a:endParaRPr lang="en-US"/>
+          </a:p>
+        </p:txBody>
+      </p:sp>
+      <p:sp>
+        <p:nvSpPr>
+          <p:cNvPr id="5" name="Right Brace 4"/>
+          <p:cNvSpPr/>
+          <p:nvPr/>
+        </p:nvSpPr>
+        <p:spPr>
+          <a:xfrm rot="5400000">
+            <a:off x="7051764" y="3766465"/>
+            <a:ext cx="418013" cy="3505200"/>
+          </a:xfrm>
+          <a:prstGeom prst="rightBrace">
+            <a:avLst/>
+          </a:prstGeom>
+          <a:ln>
+            <a:solidFill>
+              <a:srgbClr val="7030A0"/>
+            </a:solidFill>
+          </a:ln>
+        </p:spPr>
+        <p:style>
+          <a:lnRef idx="1">
+            <a:schemeClr val="accent1"/>
+          </a:lnRef>
+          <a:fillRef idx="0">
+            <a:schemeClr val="accent1"/>
+          </a:fillRef>
+          <a:effectRef idx="0">
+            <a:schemeClr val="accent1"/>
+          </a:effectRef>
+          <a:fontRef idx="minor">
+            <a:schemeClr val="tx1"/>
+          </a:fontRef>
+        </p:style>
+        <p:txBody>
+          <a:bodyPr rtlCol="0" anchor="ctr"/>
+          <a:lstStyle/>
+          <a:p>
+            <a:pPr algn="ctr"/>
+            <a:endParaRPr lang="en-US"/>
+          </a:p>
+        </p:txBody>
+      </p:sp>
+      <p:sp>
+        <p:nvSpPr>
+          <p:cNvPr id="6" name="TextBox 5"/>
+          <p:cNvSpPr txBox="1"/>
+          <p:nvPr/>
+        </p:nvSpPr>
+        <p:spPr>
+          <a:xfrm>
+            <a:off x="6631548" y="3892034"/>
+            <a:ext cx="1563248" cy="369332"/>
+          </a:xfrm>
+          <a:prstGeom prst="rect">
+            <a:avLst/>
+          </a:prstGeom>
+          <a:noFill/>
+        </p:spPr>
+        <p:txBody>
+          <a:bodyPr wrap="none" rtlCol="0">
+            <a:spAutoFit/>
+          </a:bodyPr>
+          <a:lstStyle/>
+          <a:p>
+            <a:r>
+              <a:rPr lang="en-US" dirty="0" err="1">
+                <a:solidFill>
+                  <a:srgbClr val="7030A0"/>
+                </a:solidFill>
+              </a:rPr>
+              <a:t>v</a:t>
+            </a:r>
+            <a:r>
+              <a:rPr lang="en-US" smtClean="0">
+                <a:solidFill>
+                  <a:srgbClr val="7030A0"/>
+                </a:solidFill>
+              </a:rPr>
+              <a:t>ars</a:t>
+            </a:r>
+            <a:r>
+              <a:rPr lang="en-US" dirty="0" smtClean="0">
+                <a:solidFill>
+                  <a:srgbClr val="7030A0"/>
+                </a:solidFill>
+              </a:rPr>
+              <a:t> for matrix</a:t>
+            </a:r>
+            <a:endParaRPr lang="en-US" dirty="0">
+              <a:solidFill>
+                <a:srgbClr val="7030A0"/>
+              </a:solidFill>
+            </a:endParaRPr>
+          </a:p>
+        </p:txBody>
+      </p:sp>
+      <p:sp>
+        <p:nvSpPr>
+          <p:cNvPr id="7" name="TextBox 6"/>
+          <p:cNvSpPr txBox="1"/>
+          <p:nvPr/>
+        </p:nvSpPr>
+        <p:spPr>
+          <a:xfrm>
+            <a:off x="6479146" y="5691751"/>
+            <a:ext cx="1612942" cy="369332"/>
+          </a:xfrm>
+          <a:prstGeom prst="rect">
+            <a:avLst/>
+          </a:prstGeom>
+          <a:noFill/>
+        </p:spPr>
+        <p:txBody>
+          <a:bodyPr wrap="none" rtlCol="0">
+            <a:spAutoFit/>
+          </a:bodyPr>
+          <a:lstStyle/>
+          <a:p>
+            <a:r>
+              <a:rPr lang="en-US" dirty="0">
+                <a:solidFill>
+                  <a:srgbClr val="7030A0"/>
+                </a:solidFill>
+              </a:rPr>
+              <a:t>i</a:t>
+            </a:r>
+            <a:r>
+              <a:rPr lang="en-US" dirty="0" smtClean="0">
+                <a:solidFill>
+                  <a:srgbClr val="7030A0"/>
+                </a:solidFill>
+              </a:rPr>
+              <a:t>tems for alpha</a:t>
+            </a:r>
+            <a:endParaRPr lang="en-US" dirty="0">
+              <a:solidFill>
+                <a:srgbClr val="7030A0"/>
+              </a:solidFill>
+            </a:endParaRPr>
+          </a:p>
+        </p:txBody>
+      </p:sp>
+    </p:spTree>
+    <p:extLst>
+      <p:ext uri="{BB962C8B-B14F-4D97-AF65-F5344CB8AC3E}">
+        <p14:creationId xmlns:p14="http://schemas.microsoft.com/office/powerpoint/2010/main" val="995939963"/>
+      </p:ext>
+    </p:extLst>
+  </p:cSld>
+  <p:clrMapOvr>
+    <a:masterClrMapping/>
+  </p:clrMapOvr>
+</p:sld>
+</file>
+
+<file path=ppt/slides/slide27.xml><?xml version="1.0" encoding="utf-8"?>
+<p:sld xmlns:a="http://schemas.openxmlformats.org/drawingml/2006/main" xmlns:r="http://schemas.openxmlformats.org/officeDocument/2006/relationships" xmlns:p="http://schemas.openxmlformats.org/presentationml/2006/main">
+  <p:cSld>
+    <p:spTree>
+      <p:nvGrpSpPr>
+        <p:cNvPr id="1" name=""/>
+        <p:cNvGrpSpPr/>
+        <p:nvPr/>
+      </p:nvGrpSpPr>
+      <p:grpSpPr>
+        <a:xfrm>
+          <a:off x="0" y="0"/>
+          <a:ext cx="0" cy="0"/>
+          <a:chOff x="0" y="0"/>
+          <a:chExt cx="0" cy="0"/>
+        </a:xfrm>
+      </p:grpSpPr>
+      <p:sp>
+        <p:nvSpPr>
+          <p:cNvPr id="2" name="Title 1"/>
+          <p:cNvSpPr>
+            <a:spLocks noGrp="1"/>
+          </p:cNvSpPr>
+          <p:nvPr>
+            <p:ph type="title"/>
+          </p:nvPr>
+        </p:nvSpPr>
+        <p:spPr/>
+        <p:txBody>
+          <a:bodyPr/>
+          <a:lstStyle/>
+          <a:p>
+            <a:r>
+              <a:rPr lang="en-US" dirty="0" smtClean="0"/>
+              <a:t>Correlation Matrices, Reliability, </a:t>
+            </a:r>
+            <a:r>
+              <a:rPr lang="en-US" smtClean="0"/>
+              <a:t>and </a:t>
+            </a:r>
+            <a:br>
+              <a:rPr lang="en-US" smtClean="0"/>
+            </a:br>
+            <a:r>
+              <a:rPr lang="en-US" smtClean="0"/>
+              <a:t>t-Tests</a:t>
+            </a:r>
+            <a:endParaRPr lang="en-US" dirty="0"/>
+          </a:p>
+        </p:txBody>
+      </p:sp>
+      <p:sp>
+        <p:nvSpPr>
+          <p:cNvPr id="8" name="Content Placeholder 7"/>
+          <p:cNvSpPr>
+            <a:spLocks noGrp="1"/>
+          </p:cNvSpPr>
+          <p:nvPr>
+            <p:ph idx="1"/>
+          </p:nvPr>
+        </p:nvSpPr>
+        <p:spPr/>
+        <p:txBody>
+          <a:bodyPr/>
+          <a:lstStyle/>
+          <a:p>
+            <a:r>
+              <a:rPr lang="en-US" dirty="0" smtClean="0"/>
+              <a:t>Independent samples and paired samples t-tests</a:t>
+            </a:r>
+          </a:p>
+          <a:p>
+            <a:endParaRPr lang="en-US" dirty="0" smtClean="0"/>
+          </a:p>
+          <a:p>
+            <a:endParaRPr lang="en-US" sz="2800" dirty="0"/>
+          </a:p>
+          <a:p>
+            <a:pPr marL="274320" lvl="1" indent="0" algn="ctr">
+              <a:buNone/>
+            </a:pPr>
+            <a:r>
+              <a:rPr lang="en-US" sz="2800" b="1" dirty="0" err="1" smtClean="0"/>
+              <a:t>t.test</a:t>
+            </a:r>
+            <a:r>
+              <a:rPr lang="en-US" sz="2800" b="1" dirty="0" smtClean="0"/>
+              <a:t>(satisfaction ~ Gender, data = </a:t>
+            </a:r>
+            <a:r>
+              <a:rPr lang="en-US" sz="2800" b="1" dirty="0" err="1" smtClean="0"/>
+              <a:t>acitelli</a:t>
+            </a:r>
+            <a:r>
+              <a:rPr lang="en-US" sz="2800" b="1" dirty="0" smtClean="0"/>
+              <a:t>)</a:t>
+            </a:r>
+          </a:p>
+          <a:p>
+            <a:pPr marL="274320" lvl="1" indent="0" algn="ctr">
+              <a:buNone/>
+            </a:pPr>
+            <a:endParaRPr lang="en-US" sz="2800" b="1" dirty="0"/>
+          </a:p>
+          <a:p>
+            <a:pPr marL="274320" lvl="1" indent="0" algn="ctr">
+              <a:buNone/>
+            </a:pPr>
+            <a:endParaRPr lang="en-US" sz="2800" b="1" dirty="0" smtClean="0"/>
+          </a:p>
+          <a:p>
+            <a:pPr marL="274320" lvl="1" indent="0" algn="ctr">
+              <a:buNone/>
+            </a:pPr>
+            <a:r>
+              <a:rPr lang="en-US" sz="2800" b="1" dirty="0" err="1" smtClean="0"/>
+              <a:t>t.test</a:t>
+            </a:r>
+            <a:r>
+              <a:rPr lang="en-US" sz="2800" b="1" dirty="0" smtClean="0"/>
+              <a:t>(</a:t>
+            </a:r>
+            <a:r>
+              <a:rPr lang="en-US" sz="2800" b="1" dirty="0" err="1" smtClean="0"/>
+              <a:t>self_pos</a:t>
+            </a:r>
+            <a:r>
+              <a:rPr lang="en-US" sz="2800" b="1" dirty="0" smtClean="0"/>
+              <a:t>, </a:t>
+            </a:r>
+            <a:r>
+              <a:rPr lang="en-US" sz="2800" b="1" dirty="0" err="1" smtClean="0"/>
+              <a:t>other_pos</a:t>
+            </a:r>
+            <a:r>
+              <a:rPr lang="en-US" sz="2800" b="1" dirty="0" smtClean="0"/>
+              <a:t>, data = </a:t>
+            </a:r>
+            <a:r>
+              <a:rPr lang="en-US" sz="2800" b="1" dirty="0" err="1" smtClean="0"/>
+              <a:t>acitelli</a:t>
+            </a:r>
+            <a:r>
+              <a:rPr lang="en-US" sz="2800" b="1" dirty="0" smtClean="0"/>
+              <a:t>, paired = TRUE)</a:t>
+            </a:r>
+            <a:endParaRPr lang="en-US" sz="2800" b="1" dirty="0"/>
+          </a:p>
+        </p:txBody>
+      </p:sp>
+    </p:spTree>
+    <p:extLst>
+      <p:ext uri="{BB962C8B-B14F-4D97-AF65-F5344CB8AC3E}">
+        <p14:creationId xmlns:p14="http://schemas.microsoft.com/office/powerpoint/2010/main" val="1519745171"/>
+      </p:ext>
+    </p:extLst>
+  </p:cSld>
+  <p:clrMapOvr>
+    <a:masterClrMapping/>
+  </p:clrMapOvr>
 </p:sld>
 </file>
 
@@ -5734,11 +7714,7 @@
           <a:p>
             <a:r>
               <a:rPr lang="en-US" dirty="0"/>
-              <a:t>Data </a:t>
-            </a:r>
-            <a:r>
-              <a:rPr lang="en-US" dirty="0"/>
-              <a:t>C</a:t>
+              <a:t>Data C</a:t>
             </a:r>
             <a:r>
               <a:rPr lang="en-US" dirty="0" smtClean="0"/>

</xml_diff>